<commit_message>
Added slides for 2 minute presentation of the graphics window module.
</commit_message>
<xml_diff>
--- a/Docs/DUEL REALITY .pptx
+++ b/Docs/DUEL REALITY .pptx
@@ -9,16 +9,19 @@
     <p:sldId id="257" r:id="rId3"/>
     <p:sldId id="258" r:id="rId4"/>
     <p:sldId id="259" r:id="rId5"/>
-    <p:sldId id="260" r:id="rId6"/>
-    <p:sldId id="261" r:id="rId7"/>
-    <p:sldId id="262" r:id="rId8"/>
-    <p:sldId id="263" r:id="rId9"/>
-    <p:sldId id="264" r:id="rId10"/>
-    <p:sldId id="265" r:id="rId11"/>
-    <p:sldId id="266" r:id="rId12"/>
-    <p:sldId id="267" r:id="rId13"/>
-    <p:sldId id="268" r:id="rId14"/>
-    <p:sldId id="269" r:id="rId15"/>
+    <p:sldId id="270" r:id="rId6"/>
+    <p:sldId id="271" r:id="rId7"/>
+    <p:sldId id="272" r:id="rId8"/>
+    <p:sldId id="260" r:id="rId9"/>
+    <p:sldId id="261" r:id="rId10"/>
+    <p:sldId id="262" r:id="rId11"/>
+    <p:sldId id="263" r:id="rId12"/>
+    <p:sldId id="264" r:id="rId13"/>
+    <p:sldId id="265" r:id="rId14"/>
+    <p:sldId id="266" r:id="rId15"/>
+    <p:sldId id="267" r:id="rId16"/>
+    <p:sldId id="268" r:id="rId17"/>
+    <p:sldId id="269" r:id="rId18"/>
   </p:sldIdLst>
   <p:sldSz cx="9144000" cy="6858000" type="screen4x3"/>
   <p:notesSz cx="6858000" cy="9144000"/>
@@ -302,7 +305,7 @@
             <a:fld id="{1D8BD707-D9CF-40AE-B4C6-C98DA3205C09}" type="datetimeFigureOut">
               <a:rPr lang="en-US" smtClean="0"/>
               <a:pPr/>
-              <a:t>4/15/2010</a:t>
+              <a:t>4/17/2010</a:t>
             </a:fld>
             <a:endParaRPr lang="en-US"/>
           </a:p>
@@ -469,7 +472,7 @@
             <a:fld id="{1D8BD707-D9CF-40AE-B4C6-C98DA3205C09}" type="datetimeFigureOut">
               <a:rPr lang="en-US" smtClean="0"/>
               <a:pPr/>
-              <a:t>4/15/2010</a:t>
+              <a:t>4/17/2010</a:t>
             </a:fld>
             <a:endParaRPr lang="en-US"/>
           </a:p>
@@ -646,7 +649,7 @@
             <a:fld id="{1D8BD707-D9CF-40AE-B4C6-C98DA3205C09}" type="datetimeFigureOut">
               <a:rPr lang="en-US" smtClean="0"/>
               <a:pPr/>
-              <a:t>4/15/2010</a:t>
+              <a:t>4/17/2010</a:t>
             </a:fld>
             <a:endParaRPr lang="en-US"/>
           </a:p>
@@ -813,7 +816,7 @@
             <a:fld id="{1D8BD707-D9CF-40AE-B4C6-C98DA3205C09}" type="datetimeFigureOut">
               <a:rPr lang="en-US" smtClean="0"/>
               <a:pPr/>
-              <a:t>4/15/2010</a:t>
+              <a:t>4/17/2010</a:t>
             </a:fld>
             <a:endParaRPr lang="en-US"/>
           </a:p>
@@ -1056,7 +1059,7 @@
             <a:fld id="{1D8BD707-D9CF-40AE-B4C6-C98DA3205C09}" type="datetimeFigureOut">
               <a:rPr lang="en-US" smtClean="0"/>
               <a:pPr/>
-              <a:t>4/15/2010</a:t>
+              <a:t>4/17/2010</a:t>
             </a:fld>
             <a:endParaRPr lang="en-US"/>
           </a:p>
@@ -1341,7 +1344,7 @@
             <a:fld id="{1D8BD707-D9CF-40AE-B4C6-C98DA3205C09}" type="datetimeFigureOut">
               <a:rPr lang="en-US" smtClean="0"/>
               <a:pPr/>
-              <a:t>4/15/2010</a:t>
+              <a:t>4/17/2010</a:t>
             </a:fld>
             <a:endParaRPr lang="en-US"/>
           </a:p>
@@ -1760,7 +1763,7 @@
             <a:fld id="{1D8BD707-D9CF-40AE-B4C6-C98DA3205C09}" type="datetimeFigureOut">
               <a:rPr lang="en-US" smtClean="0"/>
               <a:pPr/>
-              <a:t>4/15/2010</a:t>
+              <a:t>4/17/2010</a:t>
             </a:fld>
             <a:endParaRPr lang="en-US"/>
           </a:p>
@@ -1875,7 +1878,7 @@
             <a:fld id="{1D8BD707-D9CF-40AE-B4C6-C98DA3205C09}" type="datetimeFigureOut">
               <a:rPr lang="en-US" smtClean="0"/>
               <a:pPr/>
-              <a:t>4/15/2010</a:t>
+              <a:t>4/17/2010</a:t>
             </a:fld>
             <a:endParaRPr lang="en-US"/>
           </a:p>
@@ -1967,7 +1970,7 @@
             <a:fld id="{1D8BD707-D9CF-40AE-B4C6-C98DA3205C09}" type="datetimeFigureOut">
               <a:rPr lang="en-US" smtClean="0"/>
               <a:pPr/>
-              <a:t>4/15/2010</a:t>
+              <a:t>4/17/2010</a:t>
             </a:fld>
             <a:endParaRPr lang="en-US"/>
           </a:p>
@@ -2241,7 +2244,7 @@
             <a:fld id="{1D8BD707-D9CF-40AE-B4C6-C98DA3205C09}" type="datetimeFigureOut">
               <a:rPr lang="en-US" smtClean="0"/>
               <a:pPr/>
-              <a:t>4/15/2010</a:t>
+              <a:t>4/17/2010</a:t>
             </a:fld>
             <a:endParaRPr lang="en-US"/>
           </a:p>
@@ -2491,7 +2494,7 @@
             <a:fld id="{1D8BD707-D9CF-40AE-B4C6-C98DA3205C09}" type="datetimeFigureOut">
               <a:rPr lang="en-US" smtClean="0"/>
               <a:pPr/>
-              <a:t>4/15/2010</a:t>
+              <a:t>4/17/2010</a:t>
             </a:fld>
             <a:endParaRPr lang="en-US"/>
           </a:p>
@@ -2701,7 +2704,7 @@
             <a:fld id="{1D8BD707-D9CF-40AE-B4C6-C98DA3205C09}" type="datetimeFigureOut">
               <a:rPr lang="en-US" smtClean="0"/>
               <a:pPr/>
-              <a:t>4/15/2010</a:t>
+              <a:t>4/17/2010</a:t>
             </a:fld>
             <a:endParaRPr lang="en-US"/>
           </a:p>
@@ -3157,7 +3160,7 @@
           <p:nvPr/>
         </p:nvPicPr>
         <p:blipFill>
-          <a:blip r:embed="rId2"/>
+          <a:blip r:embed="rId2" cstate="print"/>
           <a:stretch>
             <a:fillRect/>
           </a:stretch>
@@ -3177,6 +3180,13 @@
   <p:clrMapOvr>
     <a:masterClrMapping/>
   </p:clrMapOvr>
+  <p:timing>
+    <p:tnLst>
+      <p:par>
+        <p:cTn id="1" dur="indefinite" restart="never" nodeType="tmRoot"/>
+      </p:par>
+    </p:tnLst>
+  </p:timing>
 </p:sld>
 </file>
 
@@ -3214,7 +3224,7 @@
           <a:p>
             <a:r>
               <a:rPr lang="en-US" dirty="0" smtClean="0"/>
-              <a:t>Module 4 : Summary</a:t>
+              <a:t>Module 2: Conclusion</a:t>
             </a:r>
             <a:endParaRPr lang="en-US" dirty="0"/>
           </a:p>
@@ -3235,22 +3245,6 @@
           <a:bodyPr/>
           <a:lstStyle/>
           <a:p>
-            <a:r>
-              <a:rPr lang="en-US" dirty="0" smtClean="0"/>
-              <a:t>Point1</a:t>
-            </a:r>
-          </a:p>
-          <a:p>
-            <a:r>
-              <a:rPr lang="en-US" dirty="0" smtClean="0"/>
-              <a:t>Point2</a:t>
-            </a:r>
-          </a:p>
-          <a:p>
-            <a:r>
-              <a:rPr lang="en-US" dirty="0" smtClean="0"/>
-              <a:t>point3</a:t>
-            </a:r>
             <a:endParaRPr lang="en-US" dirty="0"/>
           </a:p>
         </p:txBody>
@@ -3264,7 +3258,7 @@
           <p:nvPr/>
         </p:nvPicPr>
         <p:blipFill>
-          <a:blip r:embed="rId2"/>
+          <a:blip r:embed="rId2" cstate="print"/>
           <a:stretch>
             <a:fillRect/>
           </a:stretch>
@@ -3321,7 +3315,7 @@
           <a:p>
             <a:r>
               <a:rPr lang="en-US" dirty="0" smtClean="0"/>
-              <a:t>Module 4: Conclusion</a:t>
+              <a:t>Module 3 : Summary</a:t>
             </a:r>
             <a:endParaRPr lang="en-US" dirty="0"/>
           </a:p>
@@ -3342,6 +3336,22 @@
           <a:bodyPr/>
           <a:lstStyle/>
           <a:p>
+            <a:r>
+              <a:rPr lang="en-US" dirty="0" smtClean="0"/>
+              <a:t>Point1</a:t>
+            </a:r>
+          </a:p>
+          <a:p>
+            <a:r>
+              <a:rPr lang="en-US" dirty="0" smtClean="0"/>
+              <a:t>Point2</a:t>
+            </a:r>
+          </a:p>
+          <a:p>
+            <a:r>
+              <a:rPr lang="en-US" dirty="0" smtClean="0"/>
+              <a:t>point3</a:t>
+            </a:r>
             <a:endParaRPr lang="en-US" dirty="0"/>
           </a:p>
         </p:txBody>
@@ -3355,7 +3365,7 @@
           <p:nvPr/>
         </p:nvPicPr>
         <p:blipFill>
-          <a:blip r:embed="rId2"/>
+          <a:blip r:embed="rId2" cstate="print"/>
           <a:stretch>
             <a:fillRect/>
           </a:stretch>
@@ -3412,7 +3422,7 @@
           <a:p>
             <a:r>
               <a:rPr lang="en-US" dirty="0" smtClean="0"/>
-              <a:t>Summary </a:t>
+              <a:t>Module 3: Conclusion</a:t>
             </a:r>
             <a:endParaRPr lang="en-US" dirty="0"/>
           </a:p>
@@ -3446,7 +3456,7 @@
           <p:nvPr/>
         </p:nvPicPr>
         <p:blipFill>
-          <a:blip r:embed="rId2"/>
+          <a:blip r:embed="rId2" cstate="print"/>
           <a:stretch>
             <a:fillRect/>
           </a:stretch>
@@ -3503,7 +3513,7 @@
           <a:p>
             <a:r>
               <a:rPr lang="en-US" dirty="0" smtClean="0"/>
-              <a:t>Conclusion</a:t>
+              <a:t>Module 4 : Summary</a:t>
             </a:r>
             <a:endParaRPr lang="en-US" dirty="0"/>
           </a:p>
@@ -3524,6 +3534,22 @@
           <a:bodyPr/>
           <a:lstStyle/>
           <a:p>
+            <a:r>
+              <a:rPr lang="en-US" dirty="0" smtClean="0"/>
+              <a:t>Point1</a:t>
+            </a:r>
+          </a:p>
+          <a:p>
+            <a:r>
+              <a:rPr lang="en-US" dirty="0" smtClean="0"/>
+              <a:t>Point2</a:t>
+            </a:r>
+          </a:p>
+          <a:p>
+            <a:r>
+              <a:rPr lang="en-US" dirty="0" smtClean="0"/>
+              <a:t>point3</a:t>
+            </a:r>
             <a:endParaRPr lang="en-US" dirty="0"/>
           </a:p>
         </p:txBody>
@@ -3537,7 +3563,7 @@
           <p:nvPr/>
         </p:nvPicPr>
         <p:blipFill>
-          <a:blip r:embed="rId2"/>
+          <a:blip r:embed="rId2" cstate="print"/>
           <a:stretch>
             <a:fillRect/>
           </a:stretch>
@@ -3594,8 +3620,27 @@
           <a:p>
             <a:r>
               <a:rPr lang="en-US" dirty="0" smtClean="0"/>
-              <a:t>Questions?</a:t>
-            </a:r>
+              <a:t>Module 4: Conclusion</a:t>
+            </a:r>
+            <a:endParaRPr lang="en-US" dirty="0"/>
+          </a:p>
+        </p:txBody>
+      </p:sp>
+      <p:sp>
+        <p:nvSpPr>
+          <p:cNvPr id="3" name="Content Placeholder 2"/>
+          <p:cNvSpPr>
+            <a:spLocks noGrp="1"/>
+          </p:cNvSpPr>
+          <p:nvPr>
+            <p:ph idx="1"/>
+          </p:nvPr>
+        </p:nvSpPr>
+        <p:spPr/>
+        <p:txBody>
+          <a:bodyPr/>
+          <a:lstStyle/>
+          <a:p>
             <a:endParaRPr lang="en-US" dirty="0"/>
           </a:p>
         </p:txBody>
@@ -3609,7 +3654,261 @@
           <p:nvPr/>
         </p:nvPicPr>
         <p:blipFill>
-          <a:blip r:embed="rId2"/>
+          <a:blip r:embed="rId2" cstate="print"/>
+          <a:stretch>
+            <a:fillRect/>
+          </a:stretch>
+        </p:blipFill>
+        <p:spPr>
+          <a:xfrm>
+            <a:off x="7956253" y="0"/>
+            <a:ext cx="1187747" cy="1328738"/>
+          </a:xfrm>
+          <a:prstGeom prst="rect">
+            <a:avLst/>
+          </a:prstGeom>
+        </p:spPr>
+      </p:pic>
+    </p:spTree>
+  </p:cSld>
+  <p:clrMapOvr>
+    <a:masterClrMapping/>
+  </p:clrMapOvr>
+</p:sld>
+</file>
+
+<file path=ppt/slides/slide15.xml><?xml version="1.0" encoding="utf-8"?>
+<p:sld xmlns:a="http://schemas.openxmlformats.org/drawingml/2006/main" xmlns:r="http://schemas.openxmlformats.org/officeDocument/2006/relationships" xmlns:p="http://schemas.openxmlformats.org/presentationml/2006/main">
+  <p:cSld>
+    <p:spTree>
+      <p:nvGrpSpPr>
+        <p:cNvPr id="1" name=""/>
+        <p:cNvGrpSpPr/>
+        <p:nvPr/>
+      </p:nvGrpSpPr>
+      <p:grpSpPr>
+        <a:xfrm>
+          <a:off x="0" y="0"/>
+          <a:ext cx="0" cy="0"/>
+          <a:chOff x="0" y="0"/>
+          <a:chExt cx="0" cy="0"/>
+        </a:xfrm>
+      </p:grpSpPr>
+      <p:sp>
+        <p:nvSpPr>
+          <p:cNvPr id="2" name="Title 1"/>
+          <p:cNvSpPr>
+            <a:spLocks noGrp="1"/>
+          </p:cNvSpPr>
+          <p:nvPr>
+            <p:ph type="title"/>
+          </p:nvPr>
+        </p:nvSpPr>
+        <p:spPr/>
+        <p:txBody>
+          <a:bodyPr/>
+          <a:lstStyle/>
+          <a:p>
+            <a:r>
+              <a:rPr lang="en-US" dirty="0" smtClean="0"/>
+              <a:t>Summary </a:t>
+            </a:r>
+            <a:endParaRPr lang="en-US" dirty="0"/>
+          </a:p>
+        </p:txBody>
+      </p:sp>
+      <p:sp>
+        <p:nvSpPr>
+          <p:cNvPr id="3" name="Content Placeholder 2"/>
+          <p:cNvSpPr>
+            <a:spLocks noGrp="1"/>
+          </p:cNvSpPr>
+          <p:nvPr>
+            <p:ph idx="1"/>
+          </p:nvPr>
+        </p:nvSpPr>
+        <p:spPr/>
+        <p:txBody>
+          <a:bodyPr/>
+          <a:lstStyle/>
+          <a:p>
+            <a:endParaRPr lang="en-US" dirty="0"/>
+          </a:p>
+        </p:txBody>
+      </p:sp>
+      <p:pic>
+        <p:nvPicPr>
+          <p:cNvPr id="4" name="Picture 3" descr="logo.jpg"/>
+          <p:cNvPicPr>
+            <a:picLocks noChangeAspect="1"/>
+          </p:cNvPicPr>
+          <p:nvPr/>
+        </p:nvPicPr>
+        <p:blipFill>
+          <a:blip r:embed="rId2" cstate="print"/>
+          <a:stretch>
+            <a:fillRect/>
+          </a:stretch>
+        </p:blipFill>
+        <p:spPr>
+          <a:xfrm>
+            <a:off x="7956253" y="0"/>
+            <a:ext cx="1187747" cy="1328738"/>
+          </a:xfrm>
+          <a:prstGeom prst="rect">
+            <a:avLst/>
+          </a:prstGeom>
+        </p:spPr>
+      </p:pic>
+    </p:spTree>
+  </p:cSld>
+  <p:clrMapOvr>
+    <a:masterClrMapping/>
+  </p:clrMapOvr>
+</p:sld>
+</file>
+
+<file path=ppt/slides/slide16.xml><?xml version="1.0" encoding="utf-8"?>
+<p:sld xmlns:a="http://schemas.openxmlformats.org/drawingml/2006/main" xmlns:r="http://schemas.openxmlformats.org/officeDocument/2006/relationships" xmlns:p="http://schemas.openxmlformats.org/presentationml/2006/main">
+  <p:cSld>
+    <p:spTree>
+      <p:nvGrpSpPr>
+        <p:cNvPr id="1" name=""/>
+        <p:cNvGrpSpPr/>
+        <p:nvPr/>
+      </p:nvGrpSpPr>
+      <p:grpSpPr>
+        <a:xfrm>
+          <a:off x="0" y="0"/>
+          <a:ext cx="0" cy="0"/>
+          <a:chOff x="0" y="0"/>
+          <a:chExt cx="0" cy="0"/>
+        </a:xfrm>
+      </p:grpSpPr>
+      <p:sp>
+        <p:nvSpPr>
+          <p:cNvPr id="2" name="Title 1"/>
+          <p:cNvSpPr>
+            <a:spLocks noGrp="1"/>
+          </p:cNvSpPr>
+          <p:nvPr>
+            <p:ph type="title"/>
+          </p:nvPr>
+        </p:nvSpPr>
+        <p:spPr/>
+        <p:txBody>
+          <a:bodyPr/>
+          <a:lstStyle/>
+          <a:p>
+            <a:r>
+              <a:rPr lang="en-US" dirty="0" smtClean="0"/>
+              <a:t>Conclusion</a:t>
+            </a:r>
+            <a:endParaRPr lang="en-US" dirty="0"/>
+          </a:p>
+        </p:txBody>
+      </p:sp>
+      <p:sp>
+        <p:nvSpPr>
+          <p:cNvPr id="3" name="Content Placeholder 2"/>
+          <p:cNvSpPr>
+            <a:spLocks noGrp="1"/>
+          </p:cNvSpPr>
+          <p:nvPr>
+            <p:ph idx="1"/>
+          </p:nvPr>
+        </p:nvSpPr>
+        <p:spPr/>
+        <p:txBody>
+          <a:bodyPr/>
+          <a:lstStyle/>
+          <a:p>
+            <a:endParaRPr lang="en-US" dirty="0"/>
+          </a:p>
+        </p:txBody>
+      </p:sp>
+      <p:pic>
+        <p:nvPicPr>
+          <p:cNvPr id="4" name="Picture 3" descr="logo.jpg"/>
+          <p:cNvPicPr>
+            <a:picLocks noChangeAspect="1"/>
+          </p:cNvPicPr>
+          <p:nvPr/>
+        </p:nvPicPr>
+        <p:blipFill>
+          <a:blip r:embed="rId2" cstate="print"/>
+          <a:stretch>
+            <a:fillRect/>
+          </a:stretch>
+        </p:blipFill>
+        <p:spPr>
+          <a:xfrm>
+            <a:off x="7956253" y="0"/>
+            <a:ext cx="1187747" cy="1328738"/>
+          </a:xfrm>
+          <a:prstGeom prst="rect">
+            <a:avLst/>
+          </a:prstGeom>
+        </p:spPr>
+      </p:pic>
+    </p:spTree>
+  </p:cSld>
+  <p:clrMapOvr>
+    <a:masterClrMapping/>
+  </p:clrMapOvr>
+</p:sld>
+</file>
+
+<file path=ppt/slides/slide17.xml><?xml version="1.0" encoding="utf-8"?>
+<p:sld xmlns:a="http://schemas.openxmlformats.org/drawingml/2006/main" xmlns:r="http://schemas.openxmlformats.org/officeDocument/2006/relationships" xmlns:p="http://schemas.openxmlformats.org/presentationml/2006/main">
+  <p:cSld>
+    <p:spTree>
+      <p:nvGrpSpPr>
+        <p:cNvPr id="1" name=""/>
+        <p:cNvGrpSpPr/>
+        <p:nvPr/>
+      </p:nvGrpSpPr>
+      <p:grpSpPr>
+        <a:xfrm>
+          <a:off x="0" y="0"/>
+          <a:ext cx="0" cy="0"/>
+          <a:chOff x="0" y="0"/>
+          <a:chExt cx="0" cy="0"/>
+        </a:xfrm>
+      </p:grpSpPr>
+      <p:sp>
+        <p:nvSpPr>
+          <p:cNvPr id="2" name="Title 1"/>
+          <p:cNvSpPr>
+            <a:spLocks noGrp="1"/>
+          </p:cNvSpPr>
+          <p:nvPr>
+            <p:ph type="title"/>
+          </p:nvPr>
+        </p:nvSpPr>
+        <p:spPr/>
+        <p:txBody>
+          <a:bodyPr/>
+          <a:lstStyle/>
+          <a:p>
+            <a:r>
+              <a:rPr lang="en-US" dirty="0" smtClean="0"/>
+              <a:t>Questions?</a:t>
+            </a:r>
+            <a:endParaRPr lang="en-US" dirty="0"/>
+          </a:p>
+        </p:txBody>
+      </p:sp>
+      <p:pic>
+        <p:nvPicPr>
+          <p:cNvPr id="4" name="Picture 3" descr="logo.jpg"/>
+          <p:cNvPicPr>
+            <a:picLocks noChangeAspect="1"/>
+          </p:cNvPicPr>
+          <p:nvPr/>
+        </p:nvPicPr>
+        <p:blipFill>
+          <a:blip r:embed="rId2" cstate="print"/>
           <a:stretch>
             <a:fillRect/>
           </a:stretch>
@@ -3750,7 +4049,7 @@
           <p:nvPr/>
         </p:nvPicPr>
         <p:blipFill>
-          <a:blip r:embed="rId2"/>
+          <a:blip r:embed="rId2" cstate="print"/>
           <a:stretch>
             <a:fillRect/>
           </a:stretch>
@@ -3770,6 +4069,13 @@
   <p:clrMapOvr>
     <a:masterClrMapping/>
   </p:clrMapOvr>
+  <p:timing>
+    <p:tnLst>
+      <p:par>
+        <p:cTn id="1" dur="indefinite" restart="never" nodeType="tmRoot"/>
+      </p:par>
+    </p:tnLst>
+  </p:timing>
 </p:sld>
 </file>
 
@@ -3841,7 +4147,7 @@
           <p:nvPr/>
         </p:nvPicPr>
         <p:blipFill>
-          <a:blip r:embed="rId2"/>
+          <a:blip r:embed="rId2" cstate="print"/>
           <a:stretch>
             <a:fillRect/>
           </a:stretch>
@@ -3861,6 +4167,13 @@
   <p:clrMapOvr>
     <a:masterClrMapping/>
   </p:clrMapOvr>
+  <p:timing>
+    <p:tnLst>
+      <p:par>
+        <p:cTn id="1" dur="indefinite" restart="never" nodeType="tmRoot"/>
+      </p:par>
+    </p:tnLst>
+  </p:timing>
 </p:sld>
 </file>
 
@@ -3891,14 +4204,32 @@
             <p:ph type="title"/>
           </p:nvPr>
         </p:nvSpPr>
-        <p:spPr/>
-        <p:txBody>
-          <a:bodyPr/>
-          <a:lstStyle/>
-          <a:p>
-            <a:r>
-              <a:rPr lang="en-US" dirty="0" smtClean="0"/>
-              <a:t>Module 1 : Summary</a:t>
+        <p:spPr>
+          <a:xfrm>
+            <a:off x="457200" y="274638"/>
+            <a:ext cx="7391400" cy="1143000"/>
+          </a:xfrm>
+        </p:spPr>
+        <p:txBody>
+          <a:bodyPr>
+            <a:normAutofit fontScale="90000"/>
+          </a:bodyPr>
+          <a:lstStyle/>
+          <a:p>
+            <a:r>
+              <a:rPr lang="en-US" dirty="0" smtClean="0"/>
+              <a:t>Game Graphics Module</a:t>
+            </a:r>
+            <a:br>
+              <a:rPr lang="en-US" dirty="0" smtClean="0"/>
+            </a:br>
+            <a:r>
+              <a:rPr lang="en-US" dirty="0" smtClean="0"/>
+              <a:t>“</a:t>
+            </a:r>
+            <a:r>
+              <a:rPr lang="en-US" dirty="0" smtClean="0"/>
+              <a:t>Summary”</a:t>
             </a:r>
             <a:endParaRPr lang="en-US" dirty="0"/>
           </a:p>
@@ -3921,19 +4252,21 @@
           <a:p>
             <a:r>
               <a:rPr lang="en-US" dirty="0" smtClean="0"/>
-              <a:t>Point1</a:t>
-            </a:r>
-          </a:p>
-          <a:p>
-            <a:r>
-              <a:rPr lang="en-US" dirty="0" smtClean="0"/>
-              <a:t>Point2</a:t>
-            </a:r>
-          </a:p>
-          <a:p>
-            <a:r>
-              <a:rPr lang="en-US" dirty="0" smtClean="0"/>
-              <a:t>point3</a:t>
+              <a:t>What it is.</a:t>
+            </a:r>
+            <a:endParaRPr lang="en-US" dirty="0" smtClean="0"/>
+          </a:p>
+          <a:p>
+            <a:r>
+              <a:rPr lang="en-US" dirty="0" smtClean="0"/>
+              <a:t>What it does.</a:t>
+            </a:r>
+            <a:endParaRPr lang="en-US" dirty="0" smtClean="0"/>
+          </a:p>
+          <a:p>
+            <a:r>
+              <a:rPr lang="en-US" dirty="0" smtClean="0"/>
+              <a:t>How it works.</a:t>
             </a:r>
             <a:endParaRPr lang="en-US" dirty="0"/>
           </a:p>
@@ -3948,7 +4281,7 @@
           <p:nvPr/>
         </p:nvPicPr>
         <p:blipFill>
-          <a:blip r:embed="rId2"/>
+          <a:blip r:embed="rId2" cstate="print"/>
           <a:stretch>
             <a:fillRect/>
           </a:stretch>
@@ -3968,6 +4301,13 @@
   <p:clrMapOvr>
     <a:masterClrMapping/>
   </p:clrMapOvr>
+  <p:timing>
+    <p:tnLst>
+      <p:par>
+        <p:cTn id="1" dur="indefinite" restart="never" nodeType="tmRoot"/>
+      </p:par>
+    </p:tnLst>
+  </p:timing>
 </p:sld>
 </file>
 
@@ -4000,12 +4340,29 @@
         </p:nvSpPr>
         <p:spPr/>
         <p:txBody>
-          <a:bodyPr/>
-          <a:lstStyle/>
-          <a:p>
-            <a:r>
-              <a:rPr lang="en-US" dirty="0" smtClean="0"/>
-              <a:t>Module 1: Conclusion</a:t>
+          <a:bodyPr>
+            <a:normAutofit fontScale="90000"/>
+          </a:bodyPr>
+          <a:lstStyle/>
+          <a:p>
+            <a:r>
+              <a:rPr lang="en-US" dirty="0" smtClean="0"/>
+              <a:t>Game Graphics </a:t>
+            </a:r>
+            <a:r>
+              <a:rPr lang="en-US" dirty="0" smtClean="0"/>
+              <a:t>Module</a:t>
+            </a:r>
+            <a:r>
+              <a:rPr lang="en-US" dirty="0" smtClean="0"/>
+              <a:t/>
+            </a:r>
+            <a:br>
+              <a:rPr lang="en-US" dirty="0" smtClean="0"/>
+            </a:br>
+            <a:r>
+              <a:rPr lang="en-US" dirty="0" smtClean="0"/>
+              <a:t>“What it is”</a:t>
             </a:r>
             <a:endParaRPr lang="en-US" dirty="0"/>
           </a:p>
@@ -4026,39 +4383,46 @@
           <a:bodyPr/>
           <a:lstStyle/>
           <a:p>
+            <a:r>
+              <a:rPr lang="en-US" dirty="0" smtClean="0"/>
+              <a:t>Region of the main dialog containing the two-dimensional graphics for the game itself.</a:t>
+            </a:r>
+          </a:p>
+          <a:p>
+            <a:r>
+              <a:rPr lang="en-US" dirty="0" smtClean="0"/>
+              <a:t>Background consists of a static image representing the battle environment.</a:t>
+            </a:r>
+          </a:p>
+          <a:p>
+            <a:r>
+              <a:rPr lang="en-US" dirty="0" smtClean="0"/>
+              <a:t>Top portion (generally the sky) serves as a header region for displaying information.</a:t>
+            </a:r>
+          </a:p>
+          <a:p>
+            <a:r>
+              <a:rPr lang="en-US" dirty="0" smtClean="0"/>
+              <a:t>Lower region contains the game grid with units and objects in play.</a:t>
+            </a:r>
+          </a:p>
+          <a:p>
             <a:endParaRPr lang="en-US" dirty="0"/>
           </a:p>
         </p:txBody>
       </p:sp>
-      <p:pic>
-        <p:nvPicPr>
-          <p:cNvPr id="4" name="Picture 3" descr="logo.jpg"/>
-          <p:cNvPicPr>
-            <a:picLocks noChangeAspect="1"/>
-          </p:cNvPicPr>
-          <p:nvPr/>
-        </p:nvPicPr>
-        <p:blipFill>
-          <a:blip r:embed="rId2"/>
-          <a:stretch>
-            <a:fillRect/>
-          </a:stretch>
-        </p:blipFill>
-        <p:spPr>
-          <a:xfrm>
-            <a:off x="7956253" y="0"/>
-            <a:ext cx="1187747" cy="1328738"/>
-          </a:xfrm>
-          <a:prstGeom prst="rect">
-            <a:avLst/>
-          </a:prstGeom>
-        </p:spPr>
-      </p:pic>
     </p:spTree>
   </p:cSld>
   <p:clrMapOvr>
     <a:masterClrMapping/>
   </p:clrMapOvr>
+  <p:timing>
+    <p:tnLst>
+      <p:par>
+        <p:cTn id="1" dur="indefinite" restart="never" nodeType="tmRoot"/>
+      </p:par>
+    </p:tnLst>
+  </p:timing>
 </p:sld>
 </file>
 
@@ -4091,47 +4455,25 @@
         </p:nvSpPr>
         <p:spPr/>
         <p:txBody>
-          <a:bodyPr/>
-          <a:lstStyle/>
-          <a:p>
-            <a:r>
-              <a:rPr lang="en-US" dirty="0" smtClean="0"/>
-              <a:t>Module 2 : Summary</a:t>
-            </a:r>
-            <a:endParaRPr lang="en-US" dirty="0"/>
-          </a:p>
-        </p:txBody>
-      </p:sp>
-      <p:sp>
-        <p:nvSpPr>
-          <p:cNvPr id="3" name="Content Placeholder 2"/>
-          <p:cNvSpPr>
-            <a:spLocks noGrp="1"/>
-          </p:cNvSpPr>
-          <p:nvPr>
-            <p:ph idx="1"/>
-          </p:nvPr>
-        </p:nvSpPr>
-        <p:spPr/>
-        <p:txBody>
-          <a:bodyPr/>
-          <a:lstStyle/>
-          <a:p>
-            <a:r>
-              <a:rPr lang="en-US" dirty="0" smtClean="0"/>
-              <a:t>Point1</a:t>
-            </a:r>
-          </a:p>
-          <a:p>
-            <a:r>
-              <a:rPr lang="en-US" dirty="0" smtClean="0"/>
-              <a:t>Point2</a:t>
-            </a:r>
-          </a:p>
-          <a:p>
-            <a:r>
-              <a:rPr lang="en-US" dirty="0" smtClean="0"/>
-              <a:t>point3</a:t>
+          <a:bodyPr>
+            <a:normAutofit fontScale="90000"/>
+          </a:bodyPr>
+          <a:lstStyle/>
+          <a:p>
+            <a:r>
+              <a:rPr lang="en-US" dirty="0" smtClean="0"/>
+              <a:t>Game Graphics Module</a:t>
+            </a:r>
+            <a:br>
+              <a:rPr lang="en-US" dirty="0" smtClean="0"/>
+            </a:br>
+            <a:r>
+              <a:rPr lang="en-US" dirty="0" smtClean="0"/>
+              <a:t>“What it </a:t>
+            </a:r>
+            <a:r>
+              <a:rPr lang="en-US" dirty="0" smtClean="0"/>
+              <a:t>does”</a:t>
             </a:r>
             <a:endParaRPr lang="en-US" dirty="0"/>
           </a:p>
@@ -4139,26 +4481,30 @@
       </p:sp>
       <p:pic>
         <p:nvPicPr>
-          <p:cNvPr id="4" name="Picture 3" descr="logo.jpg"/>
+          <p:cNvPr id="4" name="Content Placeholder 3" descr="ScreenCap001.jpg"/>
           <p:cNvPicPr>
-            <a:picLocks noChangeAspect="1"/>
+            <a:picLocks noGrp="1" noChangeAspect="1"/>
           </p:cNvPicPr>
-          <p:nvPr/>
+          <p:nvPr>
+            <p:ph idx="1"/>
+          </p:nvPr>
         </p:nvPicPr>
         <p:blipFill>
-          <a:blip r:embed="rId2"/>
+          <a:blip r:embed="rId2" cstate="print"/>
           <a:stretch>
             <a:fillRect/>
           </a:stretch>
         </p:blipFill>
         <p:spPr>
           <a:xfrm>
-            <a:off x="7956253" y="0"/>
-            <a:ext cx="1187747" cy="1328738"/>
+            <a:off x="1549947" y="1600200"/>
+            <a:ext cx="6044106" cy="4525963"/>
           </a:xfrm>
-          <a:prstGeom prst="rect">
-            <a:avLst/>
-          </a:prstGeom>
+          <a:ln w="3175">
+            <a:solidFill>
+              <a:schemeClr val="tx1"/>
+            </a:solidFill>
+          </a:ln>
         </p:spPr>
       </p:pic>
     </p:spTree>
@@ -4166,6 +4512,13 @@
   <p:clrMapOvr>
     <a:masterClrMapping/>
   </p:clrMapOvr>
+  <p:timing>
+    <p:tnLst>
+      <p:par>
+        <p:cTn id="1" dur="indefinite" restart="never" nodeType="tmRoot"/>
+      </p:par>
+    </p:tnLst>
+  </p:timing>
 </p:sld>
 </file>
 
@@ -4198,12 +4551,21 @@
         </p:nvSpPr>
         <p:spPr/>
         <p:txBody>
-          <a:bodyPr/>
-          <a:lstStyle/>
-          <a:p>
-            <a:r>
-              <a:rPr lang="en-US" dirty="0" smtClean="0"/>
-              <a:t>Module 2: Conclusion</a:t>
+          <a:bodyPr>
+            <a:normAutofit fontScale="90000"/>
+          </a:bodyPr>
+          <a:lstStyle/>
+          <a:p>
+            <a:r>
+              <a:rPr lang="en-US" dirty="0" smtClean="0"/>
+              <a:t>Game Graphics Module</a:t>
+            </a:r>
+            <a:br>
+              <a:rPr lang="en-US" dirty="0" smtClean="0"/>
+            </a:br>
+            <a:r>
+              <a:rPr lang="en-US" dirty="0" smtClean="0"/>
+              <a:t>“What it does”</a:t>
             </a:r>
             <a:endParaRPr lang="en-US" dirty="0"/>
           </a:p>
@@ -4221,37 +4583,55 @@
         </p:nvSpPr>
         <p:spPr/>
         <p:txBody>
-          <a:bodyPr/>
-          <a:lstStyle/>
+          <a:bodyPr>
+            <a:normAutofit fontScale="85000" lnSpcReduction="20000"/>
+          </a:bodyPr>
+          <a:lstStyle/>
+          <a:p>
+            <a:r>
+              <a:rPr lang="en-US" dirty="0" smtClean="0"/>
+              <a:t>Accurately reflect the current state of the battle in progress through visual and auditory effects.</a:t>
+            </a:r>
+          </a:p>
+          <a:p>
+            <a:pPr lvl="1"/>
+            <a:r>
+              <a:rPr lang="en-US" dirty="0" smtClean="0"/>
+              <a:t>Grid displays all units with their health and action points.</a:t>
+            </a:r>
+          </a:p>
+          <a:p>
+            <a:pPr lvl="1"/>
+            <a:r>
+              <a:rPr lang="en-US" dirty="0" smtClean="0"/>
+              <a:t>Top region displays more detailed statistics for the current user-selected cell.</a:t>
+            </a:r>
+          </a:p>
+          <a:p>
+            <a:r>
+              <a:rPr lang="en-US" dirty="0" smtClean="0"/>
+              <a:t>Allows loading and manipulation of content by both the players and external modules.</a:t>
+            </a:r>
+          </a:p>
+          <a:p>
+            <a:pPr lvl="1"/>
+            <a:r>
+              <a:rPr lang="en-US" dirty="0" smtClean="0"/>
+              <a:t>Handles movement, attack, and defeat of individual units as requested by the game mechanics and AI.</a:t>
+            </a:r>
+          </a:p>
+          <a:p>
+            <a:pPr lvl="1"/>
+            <a:r>
+              <a:rPr lang="en-US" dirty="0" smtClean="0"/>
+              <a:t>Handles interaction between the user and the game itself.  Specifically, movement, selection, and attack of individual units is supported.</a:t>
+            </a:r>
+          </a:p>
           <a:p>
             <a:endParaRPr lang="en-US" dirty="0"/>
           </a:p>
         </p:txBody>
       </p:sp>
-      <p:pic>
-        <p:nvPicPr>
-          <p:cNvPr id="4" name="Picture 3" descr="logo.jpg"/>
-          <p:cNvPicPr>
-            <a:picLocks noChangeAspect="1"/>
-          </p:cNvPicPr>
-          <p:nvPr/>
-        </p:nvPicPr>
-        <p:blipFill>
-          <a:blip r:embed="rId2"/>
-          <a:stretch>
-            <a:fillRect/>
-          </a:stretch>
-        </p:blipFill>
-        <p:spPr>
-          <a:xfrm>
-            <a:off x="7956253" y="0"/>
-            <a:ext cx="1187747" cy="1328738"/>
-          </a:xfrm>
-          <a:prstGeom prst="rect">
-            <a:avLst/>
-          </a:prstGeom>
-        </p:spPr>
-      </p:pic>
     </p:spTree>
   </p:cSld>
   <p:clrMapOvr>
@@ -4287,14 +4667,36 @@
             <p:ph type="title"/>
           </p:nvPr>
         </p:nvSpPr>
-        <p:spPr/>
-        <p:txBody>
-          <a:bodyPr/>
-          <a:lstStyle/>
-          <a:p>
-            <a:r>
-              <a:rPr lang="en-US" dirty="0" smtClean="0"/>
-              <a:t>Module 3 : Summary</a:t>
+        <p:spPr>
+          <a:xfrm>
+            <a:off x="457200" y="274638"/>
+            <a:ext cx="7391400" cy="1143000"/>
+          </a:xfrm>
+        </p:spPr>
+        <p:txBody>
+          <a:bodyPr>
+            <a:normAutofit fontScale="90000"/>
+          </a:bodyPr>
+          <a:lstStyle/>
+          <a:p>
+            <a:r>
+              <a:rPr lang="en-US" dirty="0" smtClean="0"/>
+              <a:t>Game Graphics </a:t>
+            </a:r>
+            <a:r>
+              <a:rPr lang="en-US" dirty="0" smtClean="0"/>
+              <a:t>Module</a:t>
+            </a:r>
+            <a:br>
+              <a:rPr lang="en-US" dirty="0" smtClean="0"/>
+            </a:br>
+            <a:r>
+              <a:rPr lang="en-US" dirty="0" smtClean="0"/>
+              <a:t>“</a:t>
+            </a:r>
+            <a:r>
+              <a:rPr lang="en-US" dirty="0" smtClean="0"/>
+              <a:t>Conclusion”</a:t>
             </a:r>
             <a:endParaRPr lang="en-US" dirty="0"/>
           </a:p>
@@ -4317,20 +4719,31 @@
           <a:p>
             <a:r>
               <a:rPr lang="en-US" dirty="0" smtClean="0"/>
-              <a:t>Point1</a:t>
-            </a:r>
-          </a:p>
-          <a:p>
-            <a:r>
-              <a:rPr lang="en-US" dirty="0" smtClean="0"/>
-              <a:t>Point2</a:t>
-            </a:r>
-          </a:p>
-          <a:p>
-            <a:r>
-              <a:rPr lang="en-US" dirty="0" smtClean="0"/>
-              <a:t>point3</a:t>
-            </a:r>
+              <a:t>Graphics are crucial to any graphics based video game.</a:t>
+            </a:r>
+          </a:p>
+          <a:p>
+            <a:pPr lvl="1"/>
+            <a:r>
+              <a:rPr lang="en-US" dirty="0" smtClean="0"/>
+              <a:t>Connects the player to the game by accepting input and accurately presenting information.</a:t>
+            </a:r>
+            <a:endParaRPr lang="en-US" dirty="0" smtClean="0"/>
+          </a:p>
+          <a:p>
+            <a:r>
+              <a:rPr lang="en-US" dirty="0" smtClean="0"/>
+              <a:t>Graphics must work well with the game mechanics.</a:t>
+            </a:r>
+          </a:p>
+          <a:p>
+            <a:pPr lvl="1"/>
+            <a:r>
+              <a:rPr lang="en-US" dirty="0" smtClean="0"/>
+              <a:t>2D overhead and grid were used to provide a solid correlation between the game’s mechanics and it’s graphics.</a:t>
+            </a:r>
+          </a:p>
+          <a:p>
             <a:endParaRPr lang="en-US" dirty="0"/>
           </a:p>
         </p:txBody>
@@ -4344,7 +4757,7 @@
           <p:nvPr/>
         </p:nvPicPr>
         <p:blipFill>
-          <a:blip r:embed="rId2"/>
+          <a:blip r:embed="rId2" cstate="print"/>
           <a:stretch>
             <a:fillRect/>
           </a:stretch>
@@ -4364,6 +4777,13 @@
   <p:clrMapOvr>
     <a:masterClrMapping/>
   </p:clrMapOvr>
+  <p:timing>
+    <p:tnLst>
+      <p:par>
+        <p:cTn id="1" dur="indefinite" restart="never" nodeType="tmRoot"/>
+      </p:par>
+    </p:tnLst>
+  </p:timing>
 </p:sld>
 </file>
 
@@ -4401,7 +4821,7 @@
           <a:p>
             <a:r>
               <a:rPr lang="en-US" dirty="0" smtClean="0"/>
-              <a:t>Module 3: Conclusion</a:t>
+              <a:t>Module 2 : Summary</a:t>
             </a:r>
             <a:endParaRPr lang="en-US" dirty="0"/>
           </a:p>
@@ -4422,6 +4842,22 @@
           <a:bodyPr/>
           <a:lstStyle/>
           <a:p>
+            <a:r>
+              <a:rPr lang="en-US" dirty="0" smtClean="0"/>
+              <a:t>Point1</a:t>
+            </a:r>
+          </a:p>
+          <a:p>
+            <a:r>
+              <a:rPr lang="en-US" dirty="0" smtClean="0"/>
+              <a:t>Point2</a:t>
+            </a:r>
+          </a:p>
+          <a:p>
+            <a:r>
+              <a:rPr lang="en-US" dirty="0" smtClean="0"/>
+              <a:t>point3</a:t>
+            </a:r>
             <a:endParaRPr lang="en-US" dirty="0"/>
           </a:p>
         </p:txBody>
@@ -4435,7 +4871,7 @@
           <p:nvPr/>
         </p:nvPicPr>
         <p:blipFill>
-          <a:blip r:embed="rId2"/>
+          <a:blip r:embed="rId2" cstate="print"/>
           <a:stretch>
             <a:fillRect/>
           </a:stretch>
@@ -4455,6 +4891,13 @@
   <p:clrMapOvr>
     <a:masterClrMapping/>
   </p:clrMapOvr>
+  <p:timing>
+    <p:tnLst>
+      <p:par>
+        <p:cTn id="1" dur="indefinite" restart="never" nodeType="tmRoot"/>
+      </p:par>
+    </p:tnLst>
+  </p:timing>
 </p:sld>
 </file>
 

</xml_diff>

<commit_message>
Added some materials for UI section
</commit_message>
<xml_diff>
--- a/Docs/DUEL REALITY .pptx
+++ b/Docs/DUEL REALITY .pptx
@@ -15,13 +15,15 @@
     <p:sldId id="260" r:id="rId9"/>
     <p:sldId id="261" r:id="rId10"/>
     <p:sldId id="262" r:id="rId11"/>
-    <p:sldId id="263" r:id="rId12"/>
-    <p:sldId id="264" r:id="rId13"/>
-    <p:sldId id="265" r:id="rId14"/>
-    <p:sldId id="266" r:id="rId15"/>
-    <p:sldId id="267" r:id="rId16"/>
-    <p:sldId id="268" r:id="rId17"/>
-    <p:sldId id="269" r:id="rId18"/>
+    <p:sldId id="273" r:id="rId12"/>
+    <p:sldId id="274" r:id="rId13"/>
+    <p:sldId id="263" r:id="rId14"/>
+    <p:sldId id="264" r:id="rId15"/>
+    <p:sldId id="265" r:id="rId16"/>
+    <p:sldId id="266" r:id="rId17"/>
+    <p:sldId id="267" r:id="rId18"/>
+    <p:sldId id="268" r:id="rId19"/>
+    <p:sldId id="269" r:id="rId20"/>
   </p:sldIdLst>
   <p:sldSz cx="9144000" cy="6858000" type="screen4x3"/>
   <p:notesSz cx="6858000" cy="9144000"/>
@@ -305,7 +307,7 @@
             <a:fld id="{1D8BD707-D9CF-40AE-B4C6-C98DA3205C09}" type="datetimeFigureOut">
               <a:rPr lang="en-US" smtClean="0"/>
               <a:pPr/>
-              <a:t>4/17/2010</a:t>
+              <a:t>4/19/2010</a:t>
             </a:fld>
             <a:endParaRPr lang="en-US"/>
           </a:p>
@@ -472,7 +474,7 @@
             <a:fld id="{1D8BD707-D9CF-40AE-B4C6-C98DA3205C09}" type="datetimeFigureOut">
               <a:rPr lang="en-US" smtClean="0"/>
               <a:pPr/>
-              <a:t>4/17/2010</a:t>
+              <a:t>4/19/2010</a:t>
             </a:fld>
             <a:endParaRPr lang="en-US"/>
           </a:p>
@@ -649,7 +651,7 @@
             <a:fld id="{1D8BD707-D9CF-40AE-B4C6-C98DA3205C09}" type="datetimeFigureOut">
               <a:rPr lang="en-US" smtClean="0"/>
               <a:pPr/>
-              <a:t>4/17/2010</a:t>
+              <a:t>4/19/2010</a:t>
             </a:fld>
             <a:endParaRPr lang="en-US"/>
           </a:p>
@@ -816,7 +818,7 @@
             <a:fld id="{1D8BD707-D9CF-40AE-B4C6-C98DA3205C09}" type="datetimeFigureOut">
               <a:rPr lang="en-US" smtClean="0"/>
               <a:pPr/>
-              <a:t>4/17/2010</a:t>
+              <a:t>4/19/2010</a:t>
             </a:fld>
             <a:endParaRPr lang="en-US"/>
           </a:p>
@@ -1059,7 +1061,7 @@
             <a:fld id="{1D8BD707-D9CF-40AE-B4C6-C98DA3205C09}" type="datetimeFigureOut">
               <a:rPr lang="en-US" smtClean="0"/>
               <a:pPr/>
-              <a:t>4/17/2010</a:t>
+              <a:t>4/19/2010</a:t>
             </a:fld>
             <a:endParaRPr lang="en-US"/>
           </a:p>
@@ -1344,7 +1346,7 @@
             <a:fld id="{1D8BD707-D9CF-40AE-B4C6-C98DA3205C09}" type="datetimeFigureOut">
               <a:rPr lang="en-US" smtClean="0"/>
               <a:pPr/>
-              <a:t>4/17/2010</a:t>
+              <a:t>4/19/2010</a:t>
             </a:fld>
             <a:endParaRPr lang="en-US"/>
           </a:p>
@@ -1763,7 +1765,7 @@
             <a:fld id="{1D8BD707-D9CF-40AE-B4C6-C98DA3205C09}" type="datetimeFigureOut">
               <a:rPr lang="en-US" smtClean="0"/>
               <a:pPr/>
-              <a:t>4/17/2010</a:t>
+              <a:t>4/19/2010</a:t>
             </a:fld>
             <a:endParaRPr lang="en-US"/>
           </a:p>
@@ -1878,7 +1880,7 @@
             <a:fld id="{1D8BD707-D9CF-40AE-B4C6-C98DA3205C09}" type="datetimeFigureOut">
               <a:rPr lang="en-US" smtClean="0"/>
               <a:pPr/>
-              <a:t>4/17/2010</a:t>
+              <a:t>4/19/2010</a:t>
             </a:fld>
             <a:endParaRPr lang="en-US"/>
           </a:p>
@@ -1970,7 +1972,7 @@
             <a:fld id="{1D8BD707-D9CF-40AE-B4C6-C98DA3205C09}" type="datetimeFigureOut">
               <a:rPr lang="en-US" smtClean="0"/>
               <a:pPr/>
-              <a:t>4/17/2010</a:t>
+              <a:t>4/19/2010</a:t>
             </a:fld>
             <a:endParaRPr lang="en-US"/>
           </a:p>
@@ -2244,7 +2246,7 @@
             <a:fld id="{1D8BD707-D9CF-40AE-B4C6-C98DA3205C09}" type="datetimeFigureOut">
               <a:rPr lang="en-US" smtClean="0"/>
               <a:pPr/>
-              <a:t>4/17/2010</a:t>
+              <a:t>4/19/2010</a:t>
             </a:fld>
             <a:endParaRPr lang="en-US"/>
           </a:p>
@@ -2494,7 +2496,7 @@
             <a:fld id="{1D8BD707-D9CF-40AE-B4C6-C98DA3205C09}" type="datetimeFigureOut">
               <a:rPr lang="en-US" smtClean="0"/>
               <a:pPr/>
-              <a:t>4/17/2010</a:t>
+              <a:t>4/19/2010</a:t>
             </a:fld>
             <a:endParaRPr lang="en-US"/>
           </a:p>
@@ -2704,7 +2706,7 @@
             <a:fld id="{1D8BD707-D9CF-40AE-B4C6-C98DA3205C09}" type="datetimeFigureOut">
               <a:rPr lang="en-US" smtClean="0"/>
               <a:pPr/>
-              <a:t>4/17/2010</a:t>
+              <a:t>4/19/2010</a:t>
             </a:fld>
             <a:endParaRPr lang="en-US"/>
           </a:p>
@@ -3219,32 +3221,26 @@
         </p:nvSpPr>
         <p:spPr/>
         <p:txBody>
-          <a:bodyPr/>
-          <a:lstStyle/>
-          <a:p>
-            <a:r>
-              <a:rPr lang="en-US" dirty="0" smtClean="0"/>
-              <a:t>Module 2: Conclusion</a:t>
-            </a:r>
-            <a:endParaRPr lang="en-US" dirty="0"/>
-          </a:p>
-        </p:txBody>
-      </p:sp>
-      <p:sp>
-        <p:nvSpPr>
-          <p:cNvPr id="3" name="Content Placeholder 2"/>
-          <p:cNvSpPr>
-            <a:spLocks noGrp="1"/>
-          </p:cNvSpPr>
-          <p:nvPr>
-            <p:ph idx="1"/>
-          </p:nvPr>
-        </p:nvSpPr>
-        <p:spPr/>
-        <p:txBody>
-          <a:bodyPr/>
-          <a:lstStyle/>
-          <a:p>
+          <a:bodyPr>
+            <a:normAutofit fontScale="90000"/>
+          </a:bodyPr>
+          <a:lstStyle/>
+          <a:p>
+            <a:r>
+              <a:rPr lang="en-US" dirty="0" smtClean="0"/>
+              <a:t>User Interface </a:t>
+            </a:r>
+            <a:r>
+              <a:rPr lang="en-US" dirty="0" smtClean="0"/>
+              <a:t>Module</a:t>
+            </a:r>
+            <a:br>
+              <a:rPr lang="en-US" dirty="0" smtClean="0"/>
+            </a:br>
+            <a:r>
+              <a:rPr lang="en-US" dirty="0" smtClean="0"/>
+              <a:t>Function</a:t>
+            </a:r>
             <a:endParaRPr lang="en-US" dirty="0"/>
           </a:p>
         </p:txBody>
@@ -3273,6 +3269,46 @@
           </a:prstGeom>
         </p:spPr>
       </p:pic>
+      <p:sp>
+        <p:nvSpPr>
+          <p:cNvPr id="5" name="Content Placeholder 2"/>
+          <p:cNvSpPr>
+            <a:spLocks noGrp="1"/>
+          </p:cNvSpPr>
+          <p:nvPr>
+            <p:ph idx="1"/>
+          </p:nvPr>
+        </p:nvSpPr>
+        <p:spPr>
+          <a:xfrm>
+            <a:off x="457200" y="1600200"/>
+            <a:ext cx="8229600" cy="4525963"/>
+          </a:xfrm>
+        </p:spPr>
+        <p:txBody>
+          <a:bodyPr/>
+          <a:lstStyle/>
+          <a:p>
+            <a:r>
+              <a:rPr lang="en-US" dirty="0" smtClean="0"/>
+              <a:t>Provide the framework for user interaction with the application</a:t>
+            </a:r>
+          </a:p>
+          <a:p>
+            <a:r>
+              <a:rPr lang="en-US" dirty="0" smtClean="0"/>
+              <a:t>Architecture</a:t>
+            </a:r>
+          </a:p>
+          <a:p>
+            <a:r>
+              <a:rPr lang="en-US" dirty="0" smtClean="0"/>
+              <a:t>Model</a:t>
+            </a:r>
+            <a:endParaRPr lang="en-US" dirty="0"/>
+          </a:p>
+        </p:txBody>
+      </p:sp>
     </p:spTree>
   </p:cSld>
   <p:clrMapOvr>
@@ -3310,12 +3346,25 @@
         </p:nvSpPr>
         <p:spPr/>
         <p:txBody>
-          <a:bodyPr/>
-          <a:lstStyle/>
-          <a:p>
-            <a:r>
-              <a:rPr lang="en-US" dirty="0" smtClean="0"/>
-              <a:t>Module 3 : Summary</a:t>
+          <a:bodyPr>
+            <a:normAutofit fontScale="90000"/>
+          </a:bodyPr>
+          <a:lstStyle/>
+          <a:p>
+            <a:r>
+              <a:rPr lang="en-US" dirty="0" smtClean="0"/>
+              <a:t>User Interface </a:t>
+            </a:r>
+            <a:r>
+              <a:rPr lang="en-US" dirty="0" smtClean="0"/>
+              <a:t>Module</a:t>
+            </a:r>
+            <a:br>
+              <a:rPr lang="en-US" dirty="0" smtClean="0"/>
+            </a:br>
+            <a:r>
+              <a:rPr lang="en-US" dirty="0" smtClean="0"/>
+              <a:t>Architecture</a:t>
             </a:r>
             <a:endParaRPr lang="en-US" dirty="0"/>
           </a:p>
@@ -3331,34 +3380,26 @@
             <p:ph idx="1"/>
           </p:nvPr>
         </p:nvSpPr>
-        <p:spPr/>
-        <p:txBody>
-          <a:bodyPr/>
-          <a:lstStyle/>
-          <a:p>
-            <a:r>
-              <a:rPr lang="en-US" dirty="0" smtClean="0"/>
-              <a:t>Point1</a:t>
-            </a:r>
-          </a:p>
-          <a:p>
-            <a:r>
-              <a:rPr lang="en-US" dirty="0" smtClean="0"/>
-              <a:t>Point2</a:t>
-            </a:r>
-          </a:p>
-          <a:p>
-            <a:r>
-              <a:rPr lang="en-US" dirty="0" smtClean="0"/>
-              <a:t>point3</a:t>
-            </a:r>
-            <a:endParaRPr lang="en-US" dirty="0"/>
+        <p:spPr>
+          <a:xfrm>
+            <a:off x="457200" y="1600201"/>
+            <a:ext cx="8229600" cy="609600"/>
+          </a:xfrm>
+        </p:spPr>
+        <p:txBody>
+          <a:bodyPr/>
+          <a:lstStyle/>
+          <a:p>
+            <a:r>
+              <a:rPr lang="en-US" dirty="0" smtClean="0"/>
+              <a:t>Interaction with other modules</a:t>
+            </a:r>
           </a:p>
         </p:txBody>
       </p:sp>
       <p:pic>
         <p:nvPicPr>
-          <p:cNvPr id="4" name="Picture 3" descr="logo.jpg"/>
+          <p:cNvPr id="4" name="Picture 3" descr="UI_Architecture.png"/>
           <p:cNvPicPr>
             <a:picLocks noChangeAspect="1"/>
           </p:cNvPicPr>
@@ -3372,8 +3413,8 @@
         </p:blipFill>
         <p:spPr>
           <a:xfrm>
-            <a:off x="7956253" y="0"/>
-            <a:ext cx="1187747" cy="1328738"/>
+            <a:off x="914400" y="2590800"/>
+            <a:ext cx="7161905" cy="2676191"/>
           </a:xfrm>
           <a:prstGeom prst="rect">
             <a:avLst/>
@@ -3417,39 +3458,29 @@
         </p:nvSpPr>
         <p:spPr/>
         <p:txBody>
-          <a:bodyPr/>
-          <a:lstStyle/>
-          <a:p>
-            <a:r>
-              <a:rPr lang="en-US" dirty="0" smtClean="0"/>
-              <a:t>Module 3: Conclusion</a:t>
-            </a:r>
-            <a:endParaRPr lang="en-US" dirty="0"/>
-          </a:p>
-        </p:txBody>
-      </p:sp>
-      <p:sp>
-        <p:nvSpPr>
-          <p:cNvPr id="3" name="Content Placeholder 2"/>
-          <p:cNvSpPr>
-            <a:spLocks noGrp="1"/>
-          </p:cNvSpPr>
-          <p:nvPr>
-            <p:ph idx="1"/>
-          </p:nvPr>
-        </p:nvSpPr>
-        <p:spPr/>
-        <p:txBody>
-          <a:bodyPr/>
-          <a:lstStyle/>
-          <a:p>
+          <a:bodyPr>
+            <a:normAutofit fontScale="90000"/>
+          </a:bodyPr>
+          <a:lstStyle/>
+          <a:p>
+            <a:r>
+              <a:rPr lang="en-US" dirty="0" smtClean="0"/>
+              <a:t>User Interface Module:</a:t>
+            </a:r>
+            <a:br>
+              <a:rPr lang="en-US" dirty="0" smtClean="0"/>
+            </a:br>
+            <a:r>
+              <a:rPr lang="en-US" dirty="0" smtClean="0"/>
+              <a:t>Model</a:t>
+            </a:r>
             <a:endParaRPr lang="en-US" dirty="0"/>
           </a:p>
         </p:txBody>
       </p:sp>
       <p:pic>
         <p:nvPicPr>
-          <p:cNvPr id="4" name="Picture 3" descr="logo.jpg"/>
+          <p:cNvPr id="4" name="Picture 3" descr="UI_model.PNG"/>
           <p:cNvPicPr>
             <a:picLocks noChangeAspect="1"/>
           </p:cNvPicPr>
@@ -3463,8 +3494,8 @@
         </p:blipFill>
         <p:spPr>
           <a:xfrm>
-            <a:off x="7956253" y="0"/>
-            <a:ext cx="1187747" cy="1328738"/>
+            <a:off x="531224" y="1552574"/>
+            <a:ext cx="8003176" cy="4376737"/>
           </a:xfrm>
           <a:prstGeom prst="rect">
             <a:avLst/>
@@ -3513,7 +3544,7 @@
           <a:p>
             <a:r>
               <a:rPr lang="en-US" dirty="0" smtClean="0"/>
-              <a:t>Module 4 : Summary</a:t>
+              <a:t>Module 3 : Summary</a:t>
             </a:r>
             <a:endParaRPr lang="en-US" dirty="0"/>
           </a:p>
@@ -3620,7 +3651,7 @@
           <a:p>
             <a:r>
               <a:rPr lang="en-US" dirty="0" smtClean="0"/>
-              <a:t>Module 4: Conclusion</a:t>
+              <a:t>Module 3: Conclusion</a:t>
             </a:r>
             <a:endParaRPr lang="en-US" dirty="0"/>
           </a:p>
@@ -3711,7 +3742,7 @@
           <a:p>
             <a:r>
               <a:rPr lang="en-US" dirty="0" smtClean="0"/>
-              <a:t>Summary </a:t>
+              <a:t>Module 4 : Summary</a:t>
             </a:r>
             <a:endParaRPr lang="en-US" dirty="0"/>
           </a:p>
@@ -3732,6 +3763,22 @@
           <a:bodyPr/>
           <a:lstStyle/>
           <a:p>
+            <a:r>
+              <a:rPr lang="en-US" dirty="0" smtClean="0"/>
+              <a:t>Point1</a:t>
+            </a:r>
+          </a:p>
+          <a:p>
+            <a:r>
+              <a:rPr lang="en-US" dirty="0" smtClean="0"/>
+              <a:t>Point2</a:t>
+            </a:r>
+          </a:p>
+          <a:p>
+            <a:r>
+              <a:rPr lang="en-US" dirty="0" smtClean="0"/>
+              <a:t>point3</a:t>
+            </a:r>
             <a:endParaRPr lang="en-US" dirty="0"/>
           </a:p>
         </p:txBody>
@@ -3802,7 +3849,7 @@
           <a:p>
             <a:r>
               <a:rPr lang="en-US" dirty="0" smtClean="0"/>
-              <a:t>Conclusion</a:t>
+              <a:t>Module 4: Conclusion</a:t>
             </a:r>
             <a:endParaRPr lang="en-US" dirty="0"/>
           </a:p>
@@ -3860,6 +3907,188 @@
 </file>
 
 <file path=ppt/slides/slide17.xml><?xml version="1.0" encoding="utf-8"?>
+<p:sld xmlns:a="http://schemas.openxmlformats.org/drawingml/2006/main" xmlns:r="http://schemas.openxmlformats.org/officeDocument/2006/relationships" xmlns:p="http://schemas.openxmlformats.org/presentationml/2006/main">
+  <p:cSld>
+    <p:spTree>
+      <p:nvGrpSpPr>
+        <p:cNvPr id="1" name=""/>
+        <p:cNvGrpSpPr/>
+        <p:nvPr/>
+      </p:nvGrpSpPr>
+      <p:grpSpPr>
+        <a:xfrm>
+          <a:off x="0" y="0"/>
+          <a:ext cx="0" cy="0"/>
+          <a:chOff x="0" y="0"/>
+          <a:chExt cx="0" cy="0"/>
+        </a:xfrm>
+      </p:grpSpPr>
+      <p:sp>
+        <p:nvSpPr>
+          <p:cNvPr id="2" name="Title 1"/>
+          <p:cNvSpPr>
+            <a:spLocks noGrp="1"/>
+          </p:cNvSpPr>
+          <p:nvPr>
+            <p:ph type="title"/>
+          </p:nvPr>
+        </p:nvSpPr>
+        <p:spPr/>
+        <p:txBody>
+          <a:bodyPr/>
+          <a:lstStyle/>
+          <a:p>
+            <a:r>
+              <a:rPr lang="en-US" dirty="0" smtClean="0"/>
+              <a:t>Summary </a:t>
+            </a:r>
+            <a:endParaRPr lang="en-US" dirty="0"/>
+          </a:p>
+        </p:txBody>
+      </p:sp>
+      <p:sp>
+        <p:nvSpPr>
+          <p:cNvPr id="3" name="Content Placeholder 2"/>
+          <p:cNvSpPr>
+            <a:spLocks noGrp="1"/>
+          </p:cNvSpPr>
+          <p:nvPr>
+            <p:ph idx="1"/>
+          </p:nvPr>
+        </p:nvSpPr>
+        <p:spPr/>
+        <p:txBody>
+          <a:bodyPr/>
+          <a:lstStyle/>
+          <a:p>
+            <a:endParaRPr lang="en-US" dirty="0"/>
+          </a:p>
+        </p:txBody>
+      </p:sp>
+      <p:pic>
+        <p:nvPicPr>
+          <p:cNvPr id="4" name="Picture 3" descr="logo.jpg"/>
+          <p:cNvPicPr>
+            <a:picLocks noChangeAspect="1"/>
+          </p:cNvPicPr>
+          <p:nvPr/>
+        </p:nvPicPr>
+        <p:blipFill>
+          <a:blip r:embed="rId2" cstate="print"/>
+          <a:stretch>
+            <a:fillRect/>
+          </a:stretch>
+        </p:blipFill>
+        <p:spPr>
+          <a:xfrm>
+            <a:off x="7956253" y="0"/>
+            <a:ext cx="1187747" cy="1328738"/>
+          </a:xfrm>
+          <a:prstGeom prst="rect">
+            <a:avLst/>
+          </a:prstGeom>
+        </p:spPr>
+      </p:pic>
+    </p:spTree>
+  </p:cSld>
+  <p:clrMapOvr>
+    <a:masterClrMapping/>
+  </p:clrMapOvr>
+</p:sld>
+</file>
+
+<file path=ppt/slides/slide18.xml><?xml version="1.0" encoding="utf-8"?>
+<p:sld xmlns:a="http://schemas.openxmlformats.org/drawingml/2006/main" xmlns:r="http://schemas.openxmlformats.org/officeDocument/2006/relationships" xmlns:p="http://schemas.openxmlformats.org/presentationml/2006/main">
+  <p:cSld>
+    <p:spTree>
+      <p:nvGrpSpPr>
+        <p:cNvPr id="1" name=""/>
+        <p:cNvGrpSpPr/>
+        <p:nvPr/>
+      </p:nvGrpSpPr>
+      <p:grpSpPr>
+        <a:xfrm>
+          <a:off x="0" y="0"/>
+          <a:ext cx="0" cy="0"/>
+          <a:chOff x="0" y="0"/>
+          <a:chExt cx="0" cy="0"/>
+        </a:xfrm>
+      </p:grpSpPr>
+      <p:sp>
+        <p:nvSpPr>
+          <p:cNvPr id="2" name="Title 1"/>
+          <p:cNvSpPr>
+            <a:spLocks noGrp="1"/>
+          </p:cNvSpPr>
+          <p:nvPr>
+            <p:ph type="title"/>
+          </p:nvPr>
+        </p:nvSpPr>
+        <p:spPr/>
+        <p:txBody>
+          <a:bodyPr/>
+          <a:lstStyle/>
+          <a:p>
+            <a:r>
+              <a:rPr lang="en-US" dirty="0" smtClean="0"/>
+              <a:t>Conclusion</a:t>
+            </a:r>
+            <a:endParaRPr lang="en-US" dirty="0"/>
+          </a:p>
+        </p:txBody>
+      </p:sp>
+      <p:sp>
+        <p:nvSpPr>
+          <p:cNvPr id="3" name="Content Placeholder 2"/>
+          <p:cNvSpPr>
+            <a:spLocks noGrp="1"/>
+          </p:cNvSpPr>
+          <p:nvPr>
+            <p:ph idx="1"/>
+          </p:nvPr>
+        </p:nvSpPr>
+        <p:spPr/>
+        <p:txBody>
+          <a:bodyPr/>
+          <a:lstStyle/>
+          <a:p>
+            <a:endParaRPr lang="en-US" dirty="0"/>
+          </a:p>
+        </p:txBody>
+      </p:sp>
+      <p:pic>
+        <p:nvPicPr>
+          <p:cNvPr id="4" name="Picture 3" descr="logo.jpg"/>
+          <p:cNvPicPr>
+            <a:picLocks noChangeAspect="1"/>
+          </p:cNvPicPr>
+          <p:nvPr/>
+        </p:nvPicPr>
+        <p:blipFill>
+          <a:blip r:embed="rId2" cstate="print"/>
+          <a:stretch>
+            <a:fillRect/>
+          </a:stretch>
+        </p:blipFill>
+        <p:spPr>
+          <a:xfrm>
+            <a:off x="7956253" y="0"/>
+            <a:ext cx="1187747" cy="1328738"/>
+          </a:xfrm>
+          <a:prstGeom prst="rect">
+            <a:avLst/>
+          </a:prstGeom>
+        </p:spPr>
+      </p:pic>
+    </p:spTree>
+  </p:cSld>
+  <p:clrMapOvr>
+    <a:masterClrMapping/>
+  </p:clrMapOvr>
+</p:sld>
+</file>
+
+<file path=ppt/slides/slide19.xml><?xml version="1.0" encoding="utf-8"?>
 <p:sld xmlns:a="http://schemas.openxmlformats.org/drawingml/2006/main" xmlns:r="http://schemas.openxmlformats.org/officeDocument/2006/relationships" xmlns:p="http://schemas.openxmlformats.org/presentationml/2006/main">
   <p:cSld>
     <p:spTree>
@@ -4225,11 +4454,7 @@
             </a:br>
             <a:r>
               <a:rPr lang="en-US" dirty="0" smtClean="0"/>
-              <a:t>“</a:t>
-            </a:r>
-            <a:r>
-              <a:rPr lang="en-US" dirty="0" smtClean="0"/>
-              <a:t>Summary”</a:t>
+              <a:t>“Summary”</a:t>
             </a:r>
             <a:endParaRPr lang="en-US" dirty="0"/>
           </a:p>
@@ -4254,14 +4479,12 @@
               <a:rPr lang="en-US" dirty="0" smtClean="0"/>
               <a:t>What it is.</a:t>
             </a:r>
-            <a:endParaRPr lang="en-US" dirty="0" smtClean="0"/>
           </a:p>
           <a:p>
             <a:r>
               <a:rPr lang="en-US" dirty="0" smtClean="0"/>
               <a:t>What it does.</a:t>
             </a:r>
-            <a:endParaRPr lang="en-US" dirty="0" smtClean="0"/>
           </a:p>
           <a:p>
             <a:r>
@@ -4347,15 +4570,7 @@
           <a:p>
             <a:r>
               <a:rPr lang="en-US" dirty="0" smtClean="0"/>
-              <a:t>Game Graphics </a:t>
-            </a:r>
-            <a:r>
-              <a:rPr lang="en-US" dirty="0" smtClean="0"/>
-              <a:t>Module</a:t>
-            </a:r>
-            <a:r>
-              <a:rPr lang="en-US" dirty="0" smtClean="0"/>
-              <a:t/>
+              <a:t>Game Graphics Module</a:t>
             </a:r>
             <a:br>
               <a:rPr lang="en-US" dirty="0" smtClean="0"/>
@@ -4469,11 +4684,7 @@
             </a:br>
             <a:r>
               <a:rPr lang="en-US" dirty="0" smtClean="0"/>
-              <a:t>“What it </a:t>
-            </a:r>
-            <a:r>
-              <a:rPr lang="en-US" dirty="0" smtClean="0"/>
-              <a:t>does”</a:t>
+              <a:t>“What it does”</a:t>
             </a:r>
             <a:endParaRPr lang="en-US" dirty="0"/>
           </a:p>
@@ -4681,22 +4892,14 @@
           <a:p>
             <a:r>
               <a:rPr lang="en-US" dirty="0" smtClean="0"/>
-              <a:t>Game Graphics </a:t>
-            </a:r>
-            <a:r>
-              <a:rPr lang="en-US" dirty="0" smtClean="0"/>
-              <a:t>Module</a:t>
+              <a:t>Game Graphics Module</a:t>
             </a:r>
             <a:br>
               <a:rPr lang="en-US" dirty="0" smtClean="0"/>
             </a:br>
             <a:r>
               <a:rPr lang="en-US" dirty="0" smtClean="0"/>
-              <a:t>“</a:t>
-            </a:r>
-            <a:r>
-              <a:rPr lang="en-US" dirty="0" smtClean="0"/>
-              <a:t>Conclusion”</a:t>
+              <a:t>“Conclusion”</a:t>
             </a:r>
             <a:endParaRPr lang="en-US" dirty="0"/>
           </a:p>
@@ -4728,7 +4931,6 @@
               <a:rPr lang="en-US" dirty="0" smtClean="0"/>
               <a:t>Connects the player to the game by accepting input and accurately presenting information.</a:t>
             </a:r>
-            <a:endParaRPr lang="en-US" dirty="0" smtClean="0"/>
           </a:p>
           <a:p>
             <a:r>
@@ -4816,12 +5018,21 @@
         </p:nvSpPr>
         <p:spPr/>
         <p:txBody>
-          <a:bodyPr/>
-          <a:lstStyle/>
-          <a:p>
-            <a:r>
-              <a:rPr lang="en-US" dirty="0" smtClean="0"/>
-              <a:t>Module 2 : Summary</a:t>
+          <a:bodyPr>
+            <a:normAutofit fontScale="90000"/>
+          </a:bodyPr>
+          <a:lstStyle/>
+          <a:p>
+            <a:r>
+              <a:rPr lang="en-US" dirty="0" smtClean="0"/>
+              <a:t>User Interface Module</a:t>
+            </a:r>
+            <a:br>
+              <a:rPr lang="en-US" dirty="0" smtClean="0"/>
+            </a:br>
+            <a:r>
+              <a:rPr lang="en-US" dirty="0" smtClean="0"/>
+              <a:t>Summary</a:t>
             </a:r>
             <a:endParaRPr lang="en-US" dirty="0"/>
           </a:p>
@@ -4844,19 +5055,27 @@
           <a:p>
             <a:r>
               <a:rPr lang="en-US" dirty="0" smtClean="0"/>
-              <a:t>Point1</a:t>
-            </a:r>
-          </a:p>
-          <a:p>
-            <a:r>
-              <a:rPr lang="en-US" dirty="0" smtClean="0"/>
-              <a:t>Point2</a:t>
-            </a:r>
-          </a:p>
-          <a:p>
-            <a:r>
-              <a:rPr lang="en-US" dirty="0" smtClean="0"/>
-              <a:t>point3</a:t>
+              <a:t>Function</a:t>
+            </a:r>
+            <a:endParaRPr lang="en-US" dirty="0" smtClean="0"/>
+          </a:p>
+          <a:p>
+            <a:r>
+              <a:rPr lang="en-US" dirty="0" smtClean="0"/>
+              <a:t>Architecture</a:t>
+            </a:r>
+          </a:p>
+          <a:p>
+            <a:r>
+              <a:rPr lang="en-US" dirty="0" smtClean="0"/>
+              <a:t>Model</a:t>
+            </a:r>
+            <a:endParaRPr lang="en-US" dirty="0" smtClean="0"/>
+          </a:p>
+          <a:p>
+            <a:r>
+              <a:rPr lang="en-US" dirty="0" smtClean="0"/>
+              <a:t>Conclusion</a:t>
             </a:r>
             <a:endParaRPr lang="en-US" dirty="0"/>
           </a:p>

</xml_diff>

<commit_message>
finished overview / game mechanics
</commit_message>
<xml_diff>
--- a/Docs/DUEL REALITY .pptx
+++ b/Docs/DUEL REALITY .pptx
@@ -5,13 +5,13 @@
     <p:sldMasterId id="2147483660" r:id="rId1"/>
   </p:sldMasterIdLst>
   <p:notesMasterIdLst>
-    <p:notesMasterId r:id="rId53"/>
+    <p:notesMasterId r:id="rId54"/>
   </p:notesMasterIdLst>
   <p:handoutMasterIdLst>
-    <p:handoutMasterId r:id="rId54"/>
+    <p:handoutMasterId r:id="rId55"/>
   </p:handoutMasterIdLst>
   <p:sldIdLst>
-    <p:sldId id="256" r:id="rId2"/>
+    <p:sldId id="317" r:id="rId2"/>
     <p:sldId id="257" r:id="rId3"/>
     <p:sldId id="258" r:id="rId4"/>
     <p:sldId id="286" r:id="rId5"/>
@@ -42,26 +42,27 @@
     <p:sldId id="310" r:id="rId30"/>
     <p:sldId id="311" r:id="rId31"/>
     <p:sldId id="314" r:id="rId32"/>
-    <p:sldId id="263" r:id="rId33"/>
+    <p:sldId id="318" r:id="rId33"/>
     <p:sldId id="276" r:id="rId34"/>
     <p:sldId id="293" r:id="rId35"/>
     <p:sldId id="277" r:id="rId36"/>
     <p:sldId id="294" r:id="rId37"/>
-    <p:sldId id="297" r:id="rId38"/>
-    <p:sldId id="295" r:id="rId39"/>
-    <p:sldId id="296" r:id="rId40"/>
-    <p:sldId id="291" r:id="rId41"/>
-    <p:sldId id="278" r:id="rId42"/>
-    <p:sldId id="264" r:id="rId43"/>
-    <p:sldId id="280" r:id="rId44"/>
-    <p:sldId id="281" r:id="rId45"/>
-    <p:sldId id="282" r:id="rId46"/>
-    <p:sldId id="283" r:id="rId47"/>
-    <p:sldId id="284" r:id="rId48"/>
-    <p:sldId id="285" r:id="rId49"/>
-    <p:sldId id="267" r:id="rId50"/>
-    <p:sldId id="268" r:id="rId51"/>
-    <p:sldId id="269" r:id="rId52"/>
+    <p:sldId id="319" r:id="rId38"/>
+    <p:sldId id="323" r:id="rId39"/>
+    <p:sldId id="295" r:id="rId40"/>
+    <p:sldId id="320" r:id="rId41"/>
+    <p:sldId id="321" r:id="rId42"/>
+    <p:sldId id="291" r:id="rId43"/>
+    <p:sldId id="278" r:id="rId44"/>
+    <p:sldId id="322" r:id="rId45"/>
+    <p:sldId id="280" r:id="rId46"/>
+    <p:sldId id="281" r:id="rId47"/>
+    <p:sldId id="282" r:id="rId48"/>
+    <p:sldId id="283" r:id="rId49"/>
+    <p:sldId id="284" r:id="rId50"/>
+    <p:sldId id="285" r:id="rId51"/>
+    <p:sldId id="316" r:id="rId52"/>
+    <p:sldId id="315" r:id="rId53"/>
   </p:sldIdLst>
   <p:sldSz cx="9144000" cy="6858000" type="screen4x3"/>
   <p:notesSz cx="7315200" cy="9601200"/>
@@ -4586,8 +4587,8 @@
         </p:blipFill>
         <p:spPr>
           <a:xfrm>
-            <a:off x="7956253" y="0"/>
-            <a:ext cx="1187747" cy="1328738"/>
+            <a:off x="5638800" y="2667000"/>
+            <a:ext cx="2179664" cy="2438400"/>
           </a:xfrm>
           <a:prstGeom prst="rect">
             <a:avLst/>
@@ -7338,7 +7339,6 @@
               <a:rPr lang="en-US" dirty="0" smtClean="0"/>
               <a:t>Application Interaction Items</a:t>
             </a:r>
-            <a:endParaRPr lang="en-US" dirty="0" smtClean="0"/>
           </a:p>
           <a:p>
             <a:r>
@@ -7590,15 +7590,7 @@
           <a:p>
             <a:r>
               <a:rPr lang="en-US" dirty="0" smtClean="0"/>
-              <a:t>Provide the framework for </a:t>
-            </a:r>
-            <a:r>
-              <a:rPr lang="en-US" dirty="0" smtClean="0"/>
-              <a:t>user </a:t>
-            </a:r>
-            <a:r>
-              <a:rPr lang="en-US" dirty="0" smtClean="0"/>
-              <a:t>interaction with the application</a:t>
+              <a:t>Provide the framework for user interaction with the application</a:t>
             </a:r>
           </a:p>
         </p:txBody>
@@ -7902,15 +7894,7 @@
           <a:p>
             <a:r>
               <a:rPr lang="en-US" dirty="0" smtClean="0"/>
-              <a:t>Provide the ability for </a:t>
-            </a:r>
-            <a:r>
-              <a:rPr lang="en-US" dirty="0" smtClean="0"/>
-              <a:t>user </a:t>
-            </a:r>
-            <a:r>
-              <a:rPr lang="en-US" dirty="0" smtClean="0"/>
-              <a:t>to choose desired settings</a:t>
+              <a:t>Provide the ability for user to choose desired settings</a:t>
             </a:r>
           </a:p>
         </p:txBody>
@@ -11053,11 +11037,7 @@
           <a:p>
             <a:r>
               <a:rPr lang="en-US" dirty="0" smtClean="0"/>
-              <a:t>Modularity in game </a:t>
-            </a:r>
-            <a:r>
-              <a:rPr lang="en-US" dirty="0" smtClean="0"/>
-              <a:t>development</a:t>
+              <a:t>Modularity in game development</a:t>
             </a:r>
           </a:p>
           <a:p>
@@ -11065,7 +11045,6 @@
               <a:rPr lang="en-US" dirty="0" smtClean="0"/>
               <a:t>Time constraint</a:t>
             </a:r>
-            <a:endParaRPr lang="en-US" dirty="0" smtClean="0"/>
           </a:p>
         </p:txBody>
       </p:sp>
@@ -11247,22 +11226,22 @@
         <p:spPr/>
         <p:txBody>
           <a:bodyPr>
-            <a:normAutofit fontScale="90000"/>
+            <a:normAutofit/>
           </a:bodyPr>
           <a:lstStyle/>
           <a:p>
             <a:r>
               <a:rPr lang="en-US" dirty="0" smtClean="0"/>
-              <a:t>Game Mechanics</a:t>
+              <a:t>Game Mechanics and AI</a:t>
             </a:r>
             <a:br>
               <a:rPr lang="en-US" dirty="0" smtClean="0"/>
             </a:br>
             <a:r>
-              <a:rPr lang="en-US" dirty="0" smtClean="0"/>
-              <a:t>and AI</a:t>
-            </a:r>
-            <a:endParaRPr lang="en-US" dirty="0"/>
+              <a:rPr lang="en-US" sz="1800" dirty="0" smtClean="0"/>
+              <a:t>Presenter: Josh Kilgore</a:t>
+            </a:r>
+            <a:endParaRPr lang="en-US" sz="1800" dirty="0"/>
           </a:p>
         </p:txBody>
       </p:sp>
@@ -11318,27 +11297,27 @@
             <a:pPr lvl="1"/>
             <a:r>
               <a:rPr lang="en-US" dirty="0" smtClean="0"/>
-              <a:t>Others</a:t>
+              <a:t>Etc.</a:t>
             </a:r>
           </a:p>
           <a:p>
             <a:r>
               <a:rPr lang="en-US" dirty="0" smtClean="0"/>
-              <a:t>AI</a:t>
+              <a:t>Artificial Intelligence</a:t>
             </a:r>
           </a:p>
           <a:p>
             <a:pPr lvl="1"/>
             <a:r>
               <a:rPr lang="en-US" dirty="0" smtClean="0"/>
-              <a:t>Game Tree</a:t>
+              <a:t>What</a:t>
             </a:r>
           </a:p>
           <a:p>
             <a:pPr lvl="1"/>
             <a:r>
               <a:rPr lang="en-US" dirty="0" smtClean="0"/>
-              <a:t>Decision Making</a:t>
+              <a:t>How</a:t>
             </a:r>
             <a:endParaRPr lang="en-US" dirty="0"/>
           </a:p>
@@ -23612,6 +23591,92 @@
           </a:prstGeom>
         </p:spPr>
       </p:pic>
+      <p:sp>
+        <p:nvSpPr>
+          <p:cNvPr id="7" name="TextBox 6"/>
+          <p:cNvSpPr txBox="1"/>
+          <p:nvPr/>
+        </p:nvSpPr>
+        <p:spPr>
+          <a:xfrm>
+            <a:off x="6324600" y="2590800"/>
+            <a:ext cx="2438400" cy="2031325"/>
+          </a:xfrm>
+          <a:prstGeom prst="rect">
+            <a:avLst/>
+          </a:prstGeom>
+          <a:noFill/>
+        </p:spPr>
+        <p:txBody>
+          <a:bodyPr wrap="square" rtlCol="0">
+            <a:spAutoFit/>
+          </a:bodyPr>
+          <a:lstStyle/>
+          <a:p>
+            <a:r>
+              <a:rPr lang="en-US" dirty="0" err="1" smtClean="0"/>
+              <a:t>switchPlayers</a:t>
+            </a:r>
+            <a:r>
+              <a:rPr lang="en-US" dirty="0" smtClean="0"/>
+              <a:t>()</a:t>
+            </a:r>
+          </a:p>
+          <a:p>
+            <a:r>
+              <a:rPr lang="en-US" dirty="0" err="1" smtClean="0"/>
+              <a:t>isGameOver</a:t>
+            </a:r>
+            <a:r>
+              <a:rPr lang="en-US" dirty="0" smtClean="0"/>
+              <a:t>();</a:t>
+            </a:r>
+          </a:p>
+          <a:p>
+            <a:r>
+              <a:rPr lang="en-US" dirty="0" err="1" smtClean="0"/>
+              <a:t>moveComplete</a:t>
+            </a:r>
+            <a:r>
+              <a:rPr lang="en-US" dirty="0" smtClean="0"/>
+              <a:t>();</a:t>
+            </a:r>
+          </a:p>
+          <a:p>
+            <a:r>
+              <a:rPr lang="en-US" dirty="0" err="1" smtClean="0"/>
+              <a:t>isValidMove</a:t>
+            </a:r>
+            <a:r>
+              <a:rPr lang="en-US" dirty="0" smtClean="0"/>
+              <a:t>();</a:t>
+            </a:r>
+          </a:p>
+          <a:p>
+            <a:r>
+              <a:rPr lang="en-US" dirty="0" err="1" smtClean="0"/>
+              <a:t>isValidAttack</a:t>
+            </a:r>
+            <a:r>
+              <a:rPr lang="en-US" dirty="0" smtClean="0"/>
+              <a:t>();</a:t>
+            </a:r>
+          </a:p>
+          <a:p>
+            <a:r>
+              <a:rPr lang="en-US" dirty="0" err="1" smtClean="0"/>
+              <a:t>isOccupied</a:t>
+            </a:r>
+            <a:r>
+              <a:rPr lang="en-US" dirty="0" smtClean="0"/>
+              <a:t>();</a:t>
+            </a:r>
+          </a:p>
+          <a:p>
+            <a:endParaRPr lang="en-US" dirty="0"/>
+          </a:p>
+        </p:txBody>
+      </p:sp>
     </p:spTree>
   </p:cSld>
   <p:clrMapOvr>
@@ -23647,10 +23712,33 @@
             <p:ph type="title"/>
           </p:nvPr>
         </p:nvSpPr>
+        <p:spPr/>
+        <p:txBody>
+          <a:bodyPr/>
+          <a:lstStyle/>
+          <a:p>
+            <a:r>
+              <a:rPr lang="en-US" dirty="0" smtClean="0"/>
+              <a:t>Player Interaction</a:t>
+            </a:r>
+            <a:endParaRPr lang="en-US" dirty="0"/>
+          </a:p>
+        </p:txBody>
+      </p:sp>
+      <p:sp>
+        <p:nvSpPr>
+          <p:cNvPr id="3" name="Content Placeholder 2"/>
+          <p:cNvSpPr>
+            <a:spLocks noGrp="1"/>
+          </p:cNvSpPr>
+          <p:nvPr>
+            <p:ph idx="1"/>
+          </p:nvPr>
+        </p:nvSpPr>
         <p:spPr>
           <a:xfrm>
-            <a:off x="80684" y="155448"/>
-            <a:ext cx="8229600" cy="1252728"/>
+            <a:off x="4495800" y="1752600"/>
+            <a:ext cx="4419600" cy="4625609"/>
           </a:xfrm>
         </p:spPr>
         <p:txBody>
@@ -23659,8 +23747,26 @@
           <a:p>
             <a:r>
               <a:rPr lang="en-US" dirty="0" smtClean="0"/>
-              <a:t>Game Mechanics Class Diagram</a:t>
-            </a:r>
+              <a:t>Player sees icons </a:t>
+            </a:r>
+          </a:p>
+          <a:p>
+            <a:pPr lvl="1"/>
+            <a:r>
+              <a:rPr lang="en-US" dirty="0" smtClean="0"/>
+              <a:t>Signals </a:t>
+            </a:r>
+            <a:r>
+              <a:rPr lang="en-US" dirty="0" smtClean="0"/>
+              <a:t>&amp; </a:t>
+            </a:r>
+            <a:r>
+              <a:rPr lang="en-US" dirty="0" smtClean="0"/>
+              <a:t>slots</a:t>
+            </a:r>
+            <a:endParaRPr lang="en-US" dirty="0" smtClean="0"/>
+          </a:p>
+          <a:p>
             <a:endParaRPr lang="en-US" dirty="0"/>
           </a:p>
         </p:txBody>
@@ -23691,64 +23797,81 @@
       </p:sp>
       <p:pic>
         <p:nvPicPr>
-          <p:cNvPr id="5" name="Picture 4" descr="class1.png"/>
+          <p:cNvPr id="5" name="Picture 3"/>
           <p:cNvPicPr>
-            <a:picLocks noChangeAspect="1"/>
+            <a:picLocks noChangeAspect="1" noChangeArrowheads="1"/>
           </p:cNvPicPr>
           <p:nvPr/>
         </p:nvPicPr>
         <p:blipFill>
           <a:blip r:embed="rId2" cstate="print"/>
+          <a:srcRect/>
           <a:stretch>
             <a:fillRect/>
           </a:stretch>
         </p:blipFill>
-        <p:spPr>
+        <p:spPr bwMode="auto">
           <a:xfrm>
-            <a:off x="457200" y="1566273"/>
-            <a:ext cx="6400800" cy="5079276"/>
+            <a:off x="152400" y="1752600"/>
+            <a:ext cx="4224748" cy="4419600"/>
           </a:xfrm>
           <a:prstGeom prst="rect">
             <a:avLst/>
           </a:prstGeom>
+          <a:noFill/>
+          <a:ln w="9525">
+            <a:noFill/>
+            <a:miter lim="800000"/>
+            <a:headEnd/>
+            <a:tailEnd/>
+          </a:ln>
         </p:spPr>
       </p:pic>
-      <p:pic>
-        <p:nvPicPr>
-          <p:cNvPr id="7" name="Picture 6" descr="logo.jpg"/>
-          <p:cNvPicPr>
-            <a:picLocks noChangeAspect="1"/>
-          </p:cNvPicPr>
+      <p:sp>
+        <p:nvSpPr>
+          <p:cNvPr id="6" name="Left Arrow 5"/>
+          <p:cNvSpPr/>
           <p:nvPr/>
-        </p:nvPicPr>
-        <p:blipFill>
-          <a:blip r:embed="rId3" cstate="print"/>
-          <a:stretch>
-            <a:fillRect/>
-          </a:stretch>
-        </p:blipFill>
+        </p:nvSpPr>
         <p:spPr>
-          <a:xfrm>
-            <a:off x="7956253" y="0"/>
-            <a:ext cx="1187747" cy="1328738"/>
+          <a:xfrm rot="18860148">
+            <a:off x="1600200" y="1447800"/>
+            <a:ext cx="990600" cy="685800"/>
           </a:xfrm>
-          <a:prstGeom prst="rect">
+          <a:prstGeom prst="leftArrow">
             <a:avLst/>
           </a:prstGeom>
         </p:spPr>
-      </p:pic>
+        <p:style>
+          <a:lnRef idx="2">
+            <a:schemeClr val="accent1">
+              <a:shade val="50000"/>
+            </a:schemeClr>
+          </a:lnRef>
+          <a:fillRef idx="1">
+            <a:schemeClr val="accent1"/>
+          </a:fillRef>
+          <a:effectRef idx="0">
+            <a:schemeClr val="accent1"/>
+          </a:effectRef>
+          <a:fontRef idx="minor">
+            <a:schemeClr val="lt1"/>
+          </a:fontRef>
+        </p:style>
+        <p:txBody>
+          <a:bodyPr rtlCol="0" anchor="ctr"/>
+          <a:lstStyle/>
+          <a:p>
+            <a:pPr algn="ctr"/>
+            <a:endParaRPr lang="en-US"/>
+          </a:p>
+        </p:txBody>
+      </p:sp>
     </p:spTree>
   </p:cSld>
   <p:clrMapOvr>
     <a:masterClrMapping/>
   </p:clrMapOvr>
-  <p:timing>
-    <p:tnLst>
-      <p:par>
-        <p:cTn id="1" dur="indefinite" restart="never" nodeType="tmRoot"/>
-      </p:par>
-    </p:tnLst>
-  </p:timing>
 </p:sld>
 </file>
 
@@ -23779,52 +23902,20 @@
             <p:ph type="title"/>
           </p:nvPr>
         </p:nvSpPr>
-        <p:spPr/>
+        <p:spPr>
+          <a:xfrm>
+            <a:off x="80684" y="155448"/>
+            <a:ext cx="8229600" cy="1252728"/>
+          </a:xfrm>
+        </p:spPr>
         <p:txBody>
           <a:bodyPr/>
           <a:lstStyle/>
           <a:p>
             <a:r>
               <a:rPr lang="en-US" dirty="0" smtClean="0"/>
-              <a:t>AI</a:t>
-            </a:r>
-            <a:endParaRPr lang="en-US" dirty="0"/>
-          </a:p>
-        </p:txBody>
-      </p:sp>
-      <p:sp>
-        <p:nvSpPr>
-          <p:cNvPr id="3" name="Content Placeholder 2"/>
-          <p:cNvSpPr>
-            <a:spLocks noGrp="1"/>
-          </p:cNvSpPr>
-          <p:nvPr>
-            <p:ph idx="1"/>
-          </p:nvPr>
-        </p:nvSpPr>
-        <p:spPr/>
-        <p:txBody>
-          <a:bodyPr/>
-          <a:lstStyle/>
-          <a:p>
-            <a:r>
-              <a:rPr lang="en-US" dirty="0" smtClean="0"/>
-              <a:t>Playable Opponent</a:t>
-            </a:r>
-          </a:p>
-          <a:p>
-            <a:r>
-              <a:rPr lang="en-US" dirty="0" smtClean="0"/>
-              <a:t>Board Evaluation</a:t>
-            </a:r>
-          </a:p>
-          <a:p>
-            <a:r>
-              <a:rPr lang="en-US" dirty="0" smtClean="0"/>
-              <a:t>Decision Tree</a:t>
-            </a:r>
-          </a:p>
-          <a:p>
+              <a:t>Game Mechanics Class Diagram</a:t>
+            </a:r>
             <a:endParaRPr lang="en-US" dirty="0"/>
           </a:p>
         </p:txBody>
@@ -23853,6 +23944,125 @@
           </a:p>
         </p:txBody>
       </p:sp>
+      <p:pic>
+        <p:nvPicPr>
+          <p:cNvPr id="7" name="Picture 6" descr="logo.jpg"/>
+          <p:cNvPicPr>
+            <a:picLocks noChangeAspect="1"/>
+          </p:cNvPicPr>
+          <p:nvPr/>
+        </p:nvPicPr>
+        <p:blipFill>
+          <a:blip r:embed="rId2" cstate="print"/>
+          <a:stretch>
+            <a:fillRect/>
+          </a:stretch>
+        </p:blipFill>
+        <p:spPr>
+          <a:xfrm>
+            <a:off x="7956253" y="0"/>
+            <a:ext cx="1187747" cy="1328738"/>
+          </a:xfrm>
+          <a:prstGeom prst="rect">
+            <a:avLst/>
+          </a:prstGeom>
+        </p:spPr>
+      </p:pic>
+      <p:sp>
+        <p:nvSpPr>
+          <p:cNvPr id="6" name="Content Placeholder 2"/>
+          <p:cNvSpPr>
+            <a:spLocks noGrp="1"/>
+          </p:cNvSpPr>
+          <p:nvPr>
+            <p:ph idx="1"/>
+          </p:nvPr>
+        </p:nvSpPr>
+        <p:spPr>
+          <a:xfrm>
+            <a:off x="6096000" y="1752600"/>
+            <a:ext cx="3048000" cy="4343400"/>
+          </a:xfrm>
+        </p:spPr>
+        <p:txBody>
+          <a:bodyPr>
+            <a:normAutofit/>
+          </a:bodyPr>
+          <a:lstStyle/>
+          <a:p>
+            <a:pPr>
+              <a:buFont typeface="Arial" pitchFamily="34" charset="0"/>
+              <a:buChar char="•"/>
+            </a:pPr>
+            <a:endParaRPr lang="en-US" dirty="0" smtClean="0"/>
+          </a:p>
+          <a:p>
+            <a:pPr>
+              <a:buFont typeface="Arial" pitchFamily="34" charset="0"/>
+              <a:buChar char="•"/>
+            </a:pPr>
+            <a:r>
+              <a:rPr lang="en-US" dirty="0" smtClean="0"/>
+              <a:t>Rely on Database to store unit data</a:t>
+            </a:r>
+          </a:p>
+          <a:p>
+            <a:pPr>
+              <a:buFont typeface="Arial" pitchFamily="34" charset="0"/>
+              <a:buChar char="•"/>
+            </a:pPr>
+            <a:endParaRPr lang="en-US" dirty="0" smtClean="0"/>
+          </a:p>
+          <a:p>
+            <a:pPr>
+              <a:buFont typeface="Arial" pitchFamily="34" charset="0"/>
+              <a:buChar char="•"/>
+            </a:pPr>
+            <a:r>
+              <a:rPr lang="en-US" dirty="0" smtClean="0"/>
+              <a:t>Internal Manipulation of  data</a:t>
+            </a:r>
+          </a:p>
+          <a:p>
+            <a:endParaRPr lang="en-US" dirty="0" smtClean="0"/>
+          </a:p>
+          <a:p>
+            <a:endParaRPr lang="en-US" dirty="0"/>
+          </a:p>
+        </p:txBody>
+      </p:sp>
+      <p:pic>
+        <p:nvPicPr>
+          <p:cNvPr id="2050" name="Picture 2"/>
+          <p:cNvPicPr>
+            <a:picLocks noChangeAspect="1" noChangeArrowheads="1"/>
+          </p:cNvPicPr>
+          <p:nvPr/>
+        </p:nvPicPr>
+        <p:blipFill>
+          <a:blip r:embed="rId3" cstate="print"/>
+          <a:srcRect/>
+          <a:stretch>
+            <a:fillRect/>
+          </a:stretch>
+        </p:blipFill>
+        <p:spPr bwMode="auto">
+          <a:xfrm>
+            <a:off x="457201" y="1568644"/>
+            <a:ext cx="5410200" cy="5089331"/>
+          </a:xfrm>
+          <a:prstGeom prst="rect">
+            <a:avLst/>
+          </a:prstGeom>
+          <a:noFill/>
+          <a:ln w="9525">
+            <a:noFill/>
+            <a:miter lim="800000"/>
+            <a:headEnd/>
+            <a:tailEnd/>
+          </a:ln>
+        </p:spPr>
+      </p:pic>
     </p:spTree>
   </p:cSld>
   <p:clrMapOvr>
@@ -25493,10 +25703,33 @@
             <p:ph type="title"/>
           </p:nvPr>
         </p:nvSpPr>
+        <p:spPr/>
+        <p:txBody>
+          <a:bodyPr/>
+          <a:lstStyle/>
+          <a:p>
+            <a:r>
+              <a:rPr lang="en-US" dirty="0" smtClean="0"/>
+              <a:t>Game Mechanics Verification</a:t>
+            </a:r>
+            <a:endParaRPr lang="en-US" dirty="0"/>
+          </a:p>
+        </p:txBody>
+      </p:sp>
+      <p:sp>
+        <p:nvSpPr>
+          <p:cNvPr id="3" name="Content Placeholder 2"/>
+          <p:cNvSpPr>
+            <a:spLocks noGrp="1"/>
+          </p:cNvSpPr>
+          <p:nvPr>
+            <p:ph idx="1"/>
+          </p:nvPr>
+        </p:nvSpPr>
         <p:spPr>
           <a:xfrm>
-            <a:off x="457200" y="-152400"/>
-            <a:ext cx="8229600" cy="914400"/>
+            <a:off x="152400" y="1676401"/>
+            <a:ext cx="4419600" cy="2362200"/>
           </a:xfrm>
         </p:spPr>
         <p:txBody>
@@ -25505,9 +25738,57 @@
           <a:p>
             <a:r>
               <a:rPr lang="en-US" dirty="0" smtClean="0"/>
-              <a:t>AI - Decision Tree</a:t>
-            </a:r>
-            <a:endParaRPr lang="en-US" dirty="0"/>
+              <a:t>Initial Unit Testing  </a:t>
+            </a:r>
+            <a:r>
+              <a:rPr lang="en-US" dirty="0" smtClean="0"/>
+              <a:t>-</a:t>
+            </a:r>
+          </a:p>
+          <a:p>
+            <a:pPr>
+              <a:buNone/>
+            </a:pPr>
+            <a:r>
+              <a:rPr lang="en-US" dirty="0" smtClean="0"/>
+              <a:t> </a:t>
+            </a:r>
+            <a:r>
+              <a:rPr lang="en-US" dirty="0" smtClean="0"/>
+              <a:t>Console </a:t>
+            </a:r>
+            <a:r>
+              <a:rPr lang="en-US" dirty="0" smtClean="0"/>
+              <a:t>Version</a:t>
+            </a:r>
+          </a:p>
+          <a:p>
+            <a:r>
+              <a:rPr lang="en-US" dirty="0" smtClean="0"/>
+              <a:t>Module Testing </a:t>
+            </a:r>
+          </a:p>
+          <a:p>
+            <a:r>
+              <a:rPr lang="en-US" dirty="0" smtClean="0"/>
+              <a:t>System Testing</a:t>
+            </a:r>
+            <a:endParaRPr lang="en-US" dirty="0" smtClean="0"/>
+          </a:p>
+          <a:p>
+            <a:endParaRPr lang="en-US" dirty="0" smtClean="0"/>
+          </a:p>
+          <a:p>
+            <a:pPr>
+              <a:buNone/>
+            </a:pPr>
+            <a:endParaRPr lang="en-US" dirty="0" smtClean="0"/>
+          </a:p>
+          <a:p>
+            <a:pPr>
+              <a:buNone/>
+            </a:pPr>
+            <a:endParaRPr lang="en-US" dirty="0" smtClean="0"/>
           </a:p>
         </p:txBody>
       </p:sp>
@@ -25537,7 +25818,7 @@
       </p:sp>
       <p:pic>
         <p:nvPicPr>
-          <p:cNvPr id="47106" name="Picture 2"/>
+          <p:cNvPr id="1026" name="Picture 2"/>
           <p:cNvPicPr>
             <a:picLocks noChangeAspect="1" noChangeArrowheads="1"/>
           </p:cNvPicPr>
@@ -25545,22 +25826,20 @@
         </p:nvPicPr>
         <p:blipFill>
           <a:blip r:embed="rId2" cstate="print"/>
-          <a:srcRect t="-114" b="-200"/>
+          <a:srcRect/>
           <a:stretch>
             <a:fillRect/>
           </a:stretch>
         </p:blipFill>
         <p:spPr bwMode="auto">
           <a:xfrm>
-            <a:off x="152400" y="1447800"/>
-            <a:ext cx="4282500" cy="5353603"/>
+            <a:off x="4495800" y="1524000"/>
+            <a:ext cx="4648200" cy="5334000"/>
           </a:xfrm>
           <a:prstGeom prst="rect">
             <a:avLst/>
           </a:prstGeom>
-          <a:solidFill>
-            <a:srgbClr val="FFFFFF"/>
-          </a:solidFill>
+          <a:noFill/>
           <a:ln w="9525">
             <a:noFill/>
             <a:miter lim="800000"/>
@@ -25569,42 +25848,11 @@
           </a:ln>
         </p:spPr>
       </p:pic>
-      <p:pic>
-        <p:nvPicPr>
-          <p:cNvPr id="5" name="Picture 4" descr="class2.png"/>
-          <p:cNvPicPr>
-            <a:picLocks noChangeAspect="1"/>
-          </p:cNvPicPr>
-          <p:nvPr/>
-        </p:nvPicPr>
-        <p:blipFill>
-          <a:blip r:embed="rId3" cstate="print"/>
-          <a:stretch>
-            <a:fillRect/>
-          </a:stretch>
-        </p:blipFill>
-        <p:spPr>
-          <a:xfrm>
-            <a:off x="6324600" y="1905000"/>
-            <a:ext cx="2133600" cy="2781300"/>
-          </a:xfrm>
-          <a:prstGeom prst="rect">
-            <a:avLst/>
-          </a:prstGeom>
-        </p:spPr>
-      </p:pic>
     </p:spTree>
   </p:cSld>
   <p:clrMapOvr>
     <a:masterClrMapping/>
   </p:clrMapOvr>
-  <p:timing>
-    <p:tnLst>
-      <p:par>
-        <p:cTn id="1" dur="indefinite" restart="never" nodeType="tmRoot"/>
-      </p:par>
-    </p:tnLst>
-  </p:timing>
 </p:sld>
 </file>
 
@@ -25650,6 +25898,289 @@
       </p:sp>
       <p:sp>
         <p:nvSpPr>
+          <p:cNvPr id="3" name="Content Placeholder 2"/>
+          <p:cNvSpPr>
+            <a:spLocks noGrp="1"/>
+          </p:cNvSpPr>
+          <p:nvPr>
+            <p:ph idx="1"/>
+          </p:nvPr>
+        </p:nvSpPr>
+        <p:spPr/>
+        <p:txBody>
+          <a:bodyPr/>
+          <a:lstStyle/>
+          <a:p>
+            <a:r>
+              <a:rPr lang="en-US" dirty="0" smtClean="0"/>
+              <a:t>Provide Player with playable opponent</a:t>
+            </a:r>
+          </a:p>
+          <a:p>
+            <a:r>
+              <a:rPr lang="en-US" dirty="0" smtClean="0"/>
+              <a:t>Decision Tree</a:t>
+            </a:r>
+          </a:p>
+          <a:p>
+            <a:pPr lvl="1"/>
+            <a:r>
+              <a:rPr lang="en-US" dirty="0" smtClean="0"/>
+              <a:t>Board Evaluation</a:t>
+            </a:r>
+          </a:p>
+          <a:p>
+            <a:pPr lvl="1"/>
+            <a:r>
+              <a:rPr lang="en-US" dirty="0" smtClean="0"/>
+              <a:t>Decide on Best Action</a:t>
+            </a:r>
+          </a:p>
+          <a:p>
+            <a:r>
+              <a:rPr lang="en-US" dirty="0" smtClean="0"/>
+              <a:t>Same constraints as Player actions</a:t>
+            </a:r>
+          </a:p>
+          <a:p>
+            <a:endParaRPr lang="en-US" dirty="0" smtClean="0"/>
+          </a:p>
+          <a:p>
+            <a:endParaRPr lang="en-US" dirty="0"/>
+          </a:p>
+        </p:txBody>
+      </p:sp>
+      <p:sp>
+        <p:nvSpPr>
+          <p:cNvPr id="4" name="Slide Number Placeholder 3"/>
+          <p:cNvSpPr>
+            <a:spLocks noGrp="1"/>
+          </p:cNvSpPr>
+          <p:nvPr>
+            <p:ph type="sldNum" sz="quarter" idx="12"/>
+          </p:nvPr>
+        </p:nvSpPr>
+        <p:spPr/>
+        <p:txBody>
+          <a:bodyPr/>
+          <a:lstStyle/>
+          <a:p>
+            <a:fld id="{B6F15528-21DE-4FAA-801E-634DDDAF4B2B}" type="slidenum">
+              <a:rPr lang="en-US" smtClean="0"/>
+              <a:pPr/>
+              <a:t>41</a:t>
+            </a:fld>
+            <a:endParaRPr lang="en-US" dirty="0"/>
+          </a:p>
+        </p:txBody>
+      </p:sp>
+    </p:spTree>
+  </p:cSld>
+  <p:clrMapOvr>
+    <a:masterClrMapping/>
+  </p:clrMapOvr>
+  <p:timing>
+    <p:tnLst>
+      <p:par>
+        <p:cTn id="1" dur="indefinite" restart="never" nodeType="tmRoot"/>
+      </p:par>
+    </p:tnLst>
+  </p:timing>
+</p:sld>
+</file>
+
+<file path=ppt/slides/slide42.xml><?xml version="1.0" encoding="utf-8"?>
+<p:sld xmlns:a="http://schemas.openxmlformats.org/drawingml/2006/main" xmlns:r="http://schemas.openxmlformats.org/officeDocument/2006/relationships" xmlns:p="http://schemas.openxmlformats.org/presentationml/2006/main">
+  <p:cSld>
+    <p:spTree>
+      <p:nvGrpSpPr>
+        <p:cNvPr id="1" name=""/>
+        <p:cNvGrpSpPr/>
+        <p:nvPr/>
+      </p:nvGrpSpPr>
+      <p:grpSpPr>
+        <a:xfrm>
+          <a:off x="0" y="0"/>
+          <a:ext cx="0" cy="0"/>
+          <a:chOff x="0" y="0"/>
+          <a:chExt cx="0" cy="0"/>
+        </a:xfrm>
+      </p:grpSpPr>
+      <p:sp>
+        <p:nvSpPr>
+          <p:cNvPr id="2" name="Title 1"/>
+          <p:cNvSpPr>
+            <a:spLocks noGrp="1"/>
+          </p:cNvSpPr>
+          <p:nvPr>
+            <p:ph type="title"/>
+          </p:nvPr>
+        </p:nvSpPr>
+        <p:spPr>
+          <a:xfrm>
+            <a:off x="457200" y="-152400"/>
+            <a:ext cx="8229600" cy="914400"/>
+          </a:xfrm>
+        </p:spPr>
+        <p:txBody>
+          <a:bodyPr/>
+          <a:lstStyle/>
+          <a:p>
+            <a:r>
+              <a:rPr lang="en-US" dirty="0" smtClean="0"/>
+              <a:t>AI - Decision Tree</a:t>
+            </a:r>
+            <a:endParaRPr lang="en-US" dirty="0"/>
+          </a:p>
+        </p:txBody>
+      </p:sp>
+      <p:sp>
+        <p:nvSpPr>
+          <p:cNvPr id="4" name="Slide Number Placeholder 3"/>
+          <p:cNvSpPr>
+            <a:spLocks noGrp="1"/>
+          </p:cNvSpPr>
+          <p:nvPr>
+            <p:ph type="sldNum" sz="quarter" idx="12"/>
+          </p:nvPr>
+        </p:nvSpPr>
+        <p:spPr/>
+        <p:txBody>
+          <a:bodyPr/>
+          <a:lstStyle/>
+          <a:p>
+            <a:fld id="{B6F15528-21DE-4FAA-801E-634DDDAF4B2B}" type="slidenum">
+              <a:rPr lang="en-US" smtClean="0"/>
+              <a:pPr/>
+              <a:t>42</a:t>
+            </a:fld>
+            <a:endParaRPr lang="en-US" dirty="0"/>
+          </a:p>
+        </p:txBody>
+      </p:sp>
+      <p:pic>
+        <p:nvPicPr>
+          <p:cNvPr id="47106" name="Picture 2"/>
+          <p:cNvPicPr>
+            <a:picLocks noChangeAspect="1" noChangeArrowheads="1"/>
+          </p:cNvPicPr>
+          <p:nvPr/>
+        </p:nvPicPr>
+        <p:blipFill>
+          <a:blip r:embed="rId2" cstate="print"/>
+          <a:srcRect t="-114" b="-200"/>
+          <a:stretch>
+            <a:fillRect/>
+          </a:stretch>
+        </p:blipFill>
+        <p:spPr bwMode="auto">
+          <a:xfrm>
+            <a:off x="152400" y="1447801"/>
+            <a:ext cx="4023001" cy="5029200"/>
+          </a:xfrm>
+          <a:prstGeom prst="rect">
+            <a:avLst/>
+          </a:prstGeom>
+          <a:solidFill>
+            <a:srgbClr val="FFFFFF"/>
+          </a:solidFill>
+          <a:ln w="9525">
+            <a:noFill/>
+            <a:miter lim="800000"/>
+            <a:headEnd/>
+            <a:tailEnd/>
+          </a:ln>
+        </p:spPr>
+      </p:pic>
+      <p:pic>
+        <p:nvPicPr>
+          <p:cNvPr id="3074" name="Picture 2"/>
+          <p:cNvPicPr>
+            <a:picLocks noChangeAspect="1" noChangeArrowheads="1"/>
+          </p:cNvPicPr>
+          <p:nvPr/>
+        </p:nvPicPr>
+        <p:blipFill>
+          <a:blip r:embed="rId3" cstate="print"/>
+          <a:srcRect/>
+          <a:stretch>
+            <a:fillRect/>
+          </a:stretch>
+        </p:blipFill>
+        <p:spPr bwMode="auto">
+          <a:xfrm>
+            <a:off x="4343400" y="1524000"/>
+            <a:ext cx="4800600" cy="5137484"/>
+          </a:xfrm>
+          <a:prstGeom prst="rect">
+            <a:avLst/>
+          </a:prstGeom>
+          <a:noFill/>
+          <a:ln w="9525">
+            <a:noFill/>
+            <a:miter lim="800000"/>
+            <a:headEnd/>
+            <a:tailEnd/>
+          </a:ln>
+        </p:spPr>
+      </p:pic>
+    </p:spTree>
+  </p:cSld>
+  <p:clrMapOvr>
+    <a:masterClrMapping/>
+  </p:clrMapOvr>
+  <p:timing>
+    <p:tnLst>
+      <p:par>
+        <p:cTn id="1" dur="indefinite" restart="never" nodeType="tmRoot"/>
+      </p:par>
+    </p:tnLst>
+  </p:timing>
+</p:sld>
+</file>
+
+<file path=ppt/slides/slide43.xml><?xml version="1.0" encoding="utf-8"?>
+<p:sld xmlns:a="http://schemas.openxmlformats.org/drawingml/2006/main" xmlns:r="http://schemas.openxmlformats.org/officeDocument/2006/relationships" xmlns:p="http://schemas.openxmlformats.org/presentationml/2006/main">
+  <p:cSld>
+    <p:spTree>
+      <p:nvGrpSpPr>
+        <p:cNvPr id="1" name=""/>
+        <p:cNvGrpSpPr/>
+        <p:nvPr/>
+      </p:nvGrpSpPr>
+      <p:grpSpPr>
+        <a:xfrm>
+          <a:off x="0" y="0"/>
+          <a:ext cx="0" cy="0"/>
+          <a:chOff x="0" y="0"/>
+          <a:chExt cx="0" cy="0"/>
+        </a:xfrm>
+      </p:grpSpPr>
+      <p:sp>
+        <p:nvSpPr>
+          <p:cNvPr id="2" name="Title 1"/>
+          <p:cNvSpPr>
+            <a:spLocks noGrp="1"/>
+          </p:cNvSpPr>
+          <p:nvPr>
+            <p:ph type="title"/>
+          </p:nvPr>
+        </p:nvSpPr>
+        <p:spPr/>
+        <p:txBody>
+          <a:bodyPr/>
+          <a:lstStyle/>
+          <a:p>
+            <a:r>
+              <a:rPr lang="en-US" dirty="0" smtClean="0"/>
+              <a:t>AI</a:t>
+            </a:r>
+            <a:endParaRPr lang="en-US" dirty="0"/>
+          </a:p>
+        </p:txBody>
+      </p:sp>
+      <p:sp>
+        <p:nvSpPr>
           <p:cNvPr id="5" name="Slide Number Placeholder 4"/>
           <p:cNvSpPr>
             <a:spLocks noGrp="1"/>
@@ -25666,7 +26197,7 @@
             <a:fld id="{B6F15528-21DE-4FAA-801E-634DDDAF4B2B}" type="slidenum">
               <a:rPr lang="en-US" smtClean="0"/>
               <a:pPr/>
-              <a:t>41</a:t>
+              <a:t>43</a:t>
             </a:fld>
             <a:endParaRPr lang="en-US" dirty="0"/>
           </a:p>
@@ -31477,309 +32008,6 @@
 </p:sld>
 </file>
 
-<file path=ppt/slides/slide42.xml><?xml version="1.0" encoding="utf-8"?>
-<p:sld xmlns:a="http://schemas.openxmlformats.org/drawingml/2006/main" xmlns:r="http://schemas.openxmlformats.org/officeDocument/2006/relationships" xmlns:p="http://schemas.openxmlformats.org/presentationml/2006/main">
-  <p:cSld>
-    <p:spTree>
-      <p:nvGrpSpPr>
-        <p:cNvPr id="1" name=""/>
-        <p:cNvGrpSpPr/>
-        <p:nvPr/>
-      </p:nvGrpSpPr>
-      <p:grpSpPr>
-        <a:xfrm>
-          <a:off x="0" y="0"/>
-          <a:ext cx="0" cy="0"/>
-          <a:chOff x="0" y="0"/>
-          <a:chExt cx="0" cy="0"/>
-        </a:xfrm>
-      </p:grpSpPr>
-      <p:sp>
-        <p:nvSpPr>
-          <p:cNvPr id="2" name="Title 1"/>
-          <p:cNvSpPr>
-            <a:spLocks noGrp="1"/>
-          </p:cNvSpPr>
-          <p:nvPr>
-            <p:ph type="title"/>
-          </p:nvPr>
-        </p:nvSpPr>
-        <p:spPr/>
-        <p:txBody>
-          <a:bodyPr>
-            <a:normAutofit fontScale="90000"/>
-          </a:bodyPr>
-          <a:lstStyle/>
-          <a:p>
-            <a:r>
-              <a:rPr lang="en-US" dirty="0" smtClean="0"/>
-              <a:t>Game Mechanics &amp;</a:t>
-            </a:r>
-            <a:br>
-              <a:rPr lang="en-US" dirty="0" smtClean="0"/>
-            </a:br>
-            <a:r>
-              <a:rPr lang="en-US" dirty="0" smtClean="0"/>
-              <a:t> AI Conclusion</a:t>
-            </a:r>
-            <a:endParaRPr lang="en-US" dirty="0"/>
-          </a:p>
-        </p:txBody>
-      </p:sp>
-      <p:sp>
-        <p:nvSpPr>
-          <p:cNvPr id="3" name="Content Placeholder 2"/>
-          <p:cNvSpPr>
-            <a:spLocks noGrp="1"/>
-          </p:cNvSpPr>
-          <p:nvPr>
-            <p:ph idx="1"/>
-          </p:nvPr>
-        </p:nvSpPr>
-        <p:spPr/>
-        <p:txBody>
-          <a:bodyPr/>
-          <a:lstStyle/>
-          <a:p>
-            <a:r>
-              <a:rPr lang="en-US" dirty="0" smtClean="0"/>
-              <a:t>Units</a:t>
-            </a:r>
-          </a:p>
-          <a:p>
-            <a:r>
-              <a:rPr lang="en-US" dirty="0" smtClean="0"/>
-              <a:t>Game Mechanics</a:t>
-            </a:r>
-          </a:p>
-          <a:p>
-            <a:r>
-              <a:rPr lang="en-US" dirty="0" smtClean="0"/>
-              <a:t>AI</a:t>
-            </a:r>
-          </a:p>
-        </p:txBody>
-      </p:sp>
-      <p:sp>
-        <p:nvSpPr>
-          <p:cNvPr id="5" name="Slide Number Placeholder 4"/>
-          <p:cNvSpPr>
-            <a:spLocks noGrp="1"/>
-          </p:cNvSpPr>
-          <p:nvPr>
-            <p:ph type="sldNum" sz="quarter" idx="12"/>
-          </p:nvPr>
-        </p:nvSpPr>
-        <p:spPr/>
-        <p:txBody>
-          <a:bodyPr/>
-          <a:lstStyle/>
-          <a:p>
-            <a:fld id="{B6F15528-21DE-4FAA-801E-634DDDAF4B2B}" type="slidenum">
-              <a:rPr lang="en-US" smtClean="0"/>
-              <a:pPr/>
-              <a:t>42</a:t>
-            </a:fld>
-            <a:endParaRPr lang="en-US" dirty="0"/>
-          </a:p>
-        </p:txBody>
-      </p:sp>
-      <p:pic>
-        <p:nvPicPr>
-          <p:cNvPr id="4" name="Picture 3" descr="logo.jpg"/>
-          <p:cNvPicPr>
-            <a:picLocks noChangeAspect="1"/>
-          </p:cNvPicPr>
-          <p:nvPr/>
-        </p:nvPicPr>
-        <p:blipFill>
-          <a:blip r:embed="rId2" cstate="print"/>
-          <a:stretch>
-            <a:fillRect/>
-          </a:stretch>
-        </p:blipFill>
-        <p:spPr>
-          <a:xfrm>
-            <a:off x="7956253" y="0"/>
-            <a:ext cx="1187747" cy="1328738"/>
-          </a:xfrm>
-          <a:prstGeom prst="rect">
-            <a:avLst/>
-          </a:prstGeom>
-        </p:spPr>
-      </p:pic>
-    </p:spTree>
-  </p:cSld>
-  <p:clrMapOvr>
-    <a:masterClrMapping/>
-  </p:clrMapOvr>
-  <p:timing>
-    <p:tnLst>
-      <p:par>
-        <p:cTn id="1" dur="indefinite" restart="never" nodeType="tmRoot"/>
-      </p:par>
-    </p:tnLst>
-  </p:timing>
-</p:sld>
-</file>
-
-<file path=ppt/slides/slide43.xml><?xml version="1.0" encoding="utf-8"?>
-<p:sld xmlns:a="http://schemas.openxmlformats.org/drawingml/2006/main" xmlns:r="http://schemas.openxmlformats.org/officeDocument/2006/relationships" xmlns:p="http://schemas.openxmlformats.org/presentationml/2006/main">
-  <p:cSld>
-    <p:spTree>
-      <p:nvGrpSpPr>
-        <p:cNvPr id="1" name=""/>
-        <p:cNvGrpSpPr/>
-        <p:nvPr/>
-      </p:nvGrpSpPr>
-      <p:grpSpPr>
-        <a:xfrm>
-          <a:off x="0" y="0"/>
-          <a:ext cx="0" cy="0"/>
-          <a:chOff x="0" y="0"/>
-          <a:chExt cx="0" cy="0"/>
-        </a:xfrm>
-      </p:grpSpPr>
-      <p:sp>
-        <p:nvSpPr>
-          <p:cNvPr id="2" name="Title 1"/>
-          <p:cNvSpPr>
-            <a:spLocks noGrp="1"/>
-          </p:cNvSpPr>
-          <p:nvPr>
-            <p:ph type="title"/>
-          </p:nvPr>
-        </p:nvSpPr>
-        <p:spPr>
-          <a:xfrm>
-            <a:off x="457200" y="314094"/>
-            <a:ext cx="7391400" cy="1143000"/>
-          </a:xfrm>
-        </p:spPr>
-        <p:txBody>
-          <a:bodyPr>
-            <a:normAutofit fontScale="90000"/>
-          </a:bodyPr>
-          <a:lstStyle/>
-          <a:p>
-            <a:r>
-              <a:rPr lang="en-US" dirty="0" smtClean="0"/>
-              <a:t>Database</a:t>
-            </a:r>
-            <a:br>
-              <a:rPr lang="en-US" dirty="0" smtClean="0"/>
-            </a:br>
-            <a:r>
-              <a:rPr lang="en-US" dirty="0" smtClean="0"/>
-              <a:t>“Summary”</a:t>
-            </a:r>
-            <a:endParaRPr lang="en-US" dirty="0"/>
-          </a:p>
-        </p:txBody>
-      </p:sp>
-      <p:sp>
-        <p:nvSpPr>
-          <p:cNvPr id="3" name="Content Placeholder 2"/>
-          <p:cNvSpPr>
-            <a:spLocks noGrp="1"/>
-          </p:cNvSpPr>
-          <p:nvPr>
-            <p:ph idx="1"/>
-          </p:nvPr>
-        </p:nvSpPr>
-        <p:spPr>
-          <a:xfrm>
-            <a:off x="762000" y="2514600"/>
-            <a:ext cx="8229600" cy="3657600"/>
-          </a:xfrm>
-        </p:spPr>
-        <p:txBody>
-          <a:bodyPr/>
-          <a:lstStyle/>
-          <a:p>
-            <a:r>
-              <a:rPr lang="en-US" dirty="0" smtClean="0"/>
-              <a:t>What Database is?</a:t>
-            </a:r>
-          </a:p>
-          <a:p>
-            <a:r>
-              <a:rPr lang="en-US" dirty="0" smtClean="0"/>
-              <a:t>What Database does in the project?</a:t>
-            </a:r>
-          </a:p>
-          <a:p>
-            <a:r>
-              <a:rPr lang="en-US" dirty="0" smtClean="0"/>
-              <a:t>How Database works?</a:t>
-            </a:r>
-            <a:endParaRPr lang="en-US" dirty="0"/>
-          </a:p>
-        </p:txBody>
-      </p:sp>
-      <p:sp>
-        <p:nvSpPr>
-          <p:cNvPr id="5" name="Slide Number Placeholder 4"/>
-          <p:cNvSpPr>
-            <a:spLocks noGrp="1"/>
-          </p:cNvSpPr>
-          <p:nvPr>
-            <p:ph type="sldNum" sz="quarter" idx="12"/>
-          </p:nvPr>
-        </p:nvSpPr>
-        <p:spPr/>
-        <p:txBody>
-          <a:bodyPr/>
-          <a:lstStyle/>
-          <a:p>
-            <a:fld id="{B6F15528-21DE-4FAA-801E-634DDDAF4B2B}" type="slidenum">
-              <a:rPr lang="en-US" smtClean="0"/>
-              <a:pPr/>
-              <a:t>43</a:t>
-            </a:fld>
-            <a:endParaRPr lang="en-US" dirty="0"/>
-          </a:p>
-        </p:txBody>
-      </p:sp>
-      <p:pic>
-        <p:nvPicPr>
-          <p:cNvPr id="4" name="Picture 3" descr="logo.jpg"/>
-          <p:cNvPicPr>
-            <a:picLocks noChangeAspect="1"/>
-          </p:cNvPicPr>
-          <p:nvPr/>
-        </p:nvPicPr>
-        <p:blipFill>
-          <a:blip r:embed="rId2" cstate="print"/>
-          <a:stretch>
-            <a:fillRect/>
-          </a:stretch>
-        </p:blipFill>
-        <p:spPr>
-          <a:xfrm>
-            <a:off x="7956253" y="0"/>
-            <a:ext cx="1187747" cy="1328738"/>
-          </a:xfrm>
-          <a:prstGeom prst="rect">
-            <a:avLst/>
-          </a:prstGeom>
-        </p:spPr>
-      </p:pic>
-    </p:spTree>
-  </p:cSld>
-  <p:clrMapOvr>
-    <a:masterClrMapping/>
-  </p:clrMapOvr>
-  <p:timing>
-    <p:tnLst>
-      <p:par>
-        <p:cTn id="1" dur="indefinite" restart="never" nodeType="tmRoot"/>
-      </p:par>
-    </p:tnLst>
-  </p:timing>
-</p:sld>
-</file>
-
 <file path=ppt/slides/slide44.xml><?xml version="1.0" encoding="utf-8"?>
 <p:sld xmlns:a="http://schemas.openxmlformats.org/drawingml/2006/main" xmlns:r="http://schemas.openxmlformats.org/officeDocument/2006/relationships" xmlns:p="http://schemas.openxmlformats.org/presentationml/2006/main">
   <p:cSld>
@@ -31816,18 +32044,14 @@
           <a:p>
             <a:r>
               <a:rPr lang="en-US" dirty="0" smtClean="0"/>
-              <a:t>Database</a:t>
+              <a:t>Game Mechanics &amp;</a:t>
             </a:r>
             <a:br>
               <a:rPr lang="en-US" dirty="0" smtClean="0"/>
             </a:br>
             <a:r>
               <a:rPr lang="en-US" dirty="0" smtClean="0"/>
-              <a:t>“</a:t>
-            </a:r>
-            <a:r>
-              <a:rPr lang="en-US" altLang="zh-CN" dirty="0" smtClean="0"/>
-              <a:t>What Database is”</a:t>
+              <a:t> AI Conclusion</a:t>
             </a:r>
             <a:endParaRPr lang="en-US" dirty="0"/>
           </a:p>
@@ -31843,39 +32067,41 @@
             <p:ph idx="1"/>
           </p:nvPr>
         </p:nvSpPr>
-        <p:spPr>
-          <a:xfrm>
-            <a:off x="381000" y="1646237"/>
-            <a:ext cx="8610600" cy="4525963"/>
-          </a:xfrm>
-        </p:spPr>
+        <p:spPr/>
         <p:txBody>
-          <a:bodyPr>
-            <a:normAutofit fontScale="92500"/>
-          </a:bodyPr>
+          <a:bodyPr/>
           <a:lstStyle/>
           <a:p>
             <a:r>
-              <a:rPr lang="en-US" altLang="zh-CN" dirty="0" smtClean="0"/>
-              <a:t>Databases consist of software-based "containers" that are structured to collect and store information.</a:t>
-            </a:r>
-          </a:p>
-          <a:p>
-            <a:r>
-              <a:rPr lang="en-US" altLang="zh-CN" dirty="0" smtClean="0"/>
-              <a:t>Database programs are designed for users so that they can retrieve, add, update or remove information.</a:t>
-            </a:r>
-          </a:p>
-          <a:p>
-            <a:r>
-              <a:rPr lang="en-US" altLang="zh-CN" dirty="0" smtClean="0"/>
-              <a:t>The structure of a database is tabular, consisting of rows and columns of information.</a:t>
-            </a:r>
-          </a:p>
-          <a:p>
-            <a:r>
-              <a:rPr lang="en-US" altLang="zh-CN" dirty="0" smtClean="0"/>
-              <a:t>A number of database architectures exist. Many databases use a combination of strategies.</a:t>
+              <a:rPr lang="en-US" dirty="0" smtClean="0"/>
+              <a:t>Game Mechanics</a:t>
+            </a:r>
+          </a:p>
+          <a:p>
+            <a:pPr lvl="1"/>
+            <a:r>
+              <a:rPr lang="en-US" dirty="0" smtClean="0"/>
+              <a:t>Classes </a:t>
+            </a:r>
+          </a:p>
+          <a:p>
+            <a:pPr lvl="1"/>
+            <a:r>
+              <a:rPr lang="en-US" dirty="0" smtClean="0"/>
+              <a:t>Functions</a:t>
+            </a:r>
+          </a:p>
+          <a:p>
+            <a:r>
+              <a:rPr lang="en-US" dirty="0" smtClean="0"/>
+              <a:t>AI</a:t>
+            </a:r>
+          </a:p>
+          <a:p>
+            <a:pPr lvl="1"/>
+            <a:r>
+              <a:rPr lang="en-US" dirty="0" smtClean="0"/>
+              <a:t>Opponent generation</a:t>
             </a:r>
           </a:p>
         </p:txBody>
@@ -31972,8 +32198,8 @@
         </p:nvSpPr>
         <p:spPr>
           <a:xfrm>
-            <a:off x="-76200" y="274638"/>
-            <a:ext cx="8382000" cy="1143000"/>
+            <a:off x="457200" y="314094"/>
+            <a:ext cx="7391400" cy="1143000"/>
           </a:xfrm>
         </p:spPr>
         <p:txBody>
@@ -31991,11 +32217,7 @@
             </a:br>
             <a:r>
               <a:rPr lang="en-US" dirty="0" smtClean="0"/>
-              <a:t>“</a:t>
-            </a:r>
-            <a:r>
-              <a:rPr lang="en-US" altLang="zh-CN" dirty="0" smtClean="0"/>
-              <a:t>What Database does in the project”</a:t>
+              <a:t>“Summary”</a:t>
             </a:r>
             <a:endParaRPr lang="en-US" dirty="0"/>
           </a:p>
@@ -32013,33 +32235,31 @@
         </p:nvSpPr>
         <p:spPr>
           <a:xfrm>
-            <a:off x="457200" y="1798637"/>
-            <a:ext cx="8229600" cy="4525963"/>
+            <a:off x="762000" y="2514600"/>
+            <a:ext cx="8229600" cy="3657600"/>
           </a:xfrm>
         </p:spPr>
         <p:txBody>
-          <a:bodyPr>
-            <a:normAutofit/>
-          </a:bodyPr>
+          <a:bodyPr/>
           <a:lstStyle/>
           <a:p>
             <a:r>
-              <a:rPr lang="en-US" altLang="zh-CN" dirty="0" smtClean="0"/>
-              <a:t>The game database contains all of data records</a:t>
-            </a:r>
-          </a:p>
-          <a:p>
-            <a:r>
-              <a:rPr lang="en-US" altLang="zh-CN" dirty="0" smtClean="0"/>
-              <a:t>Tables collection of the names, parameters, status of all game units, and the game contents such as maps.</a:t>
-            </a:r>
-          </a:p>
-          <a:p>
-            <a:r>
-              <a:rPr lang="en-US" altLang="zh-CN" dirty="0" smtClean="0"/>
-              <a:t>The data is retrieved and overwritten for synchronous/ asynchronous backup.</a:t>
-            </a:r>
-            <a:endParaRPr lang="zh-CN" altLang="zh-CN" dirty="0" smtClean="0"/>
+              <a:rPr lang="en-US" dirty="0" smtClean="0"/>
+              <a:t>What Database is?</a:t>
+            </a:r>
+          </a:p>
+          <a:p>
+            <a:r>
+              <a:rPr lang="en-US" dirty="0" smtClean="0"/>
+              <a:t>What Database does in the project?</a:t>
+            </a:r>
+          </a:p>
+          <a:p>
+            <a:r>
+              <a:rPr lang="en-US" dirty="0" smtClean="0"/>
+              <a:t>How Database works?</a:t>
+            </a:r>
+            <a:endParaRPr lang="en-US" dirty="0"/>
           </a:p>
         </p:txBody>
       </p:sp>
@@ -32133,12 +32353,7 @@
             <p:ph type="title"/>
           </p:nvPr>
         </p:nvSpPr>
-        <p:spPr>
-          <a:xfrm>
-            <a:off x="228600" y="274638"/>
-            <a:ext cx="8382000" cy="1143000"/>
-          </a:xfrm>
-        </p:spPr>
+        <p:spPr/>
         <p:txBody>
           <a:bodyPr>
             <a:normAutofit fontScale="90000"/>
@@ -32158,9 +32373,56 @@
             </a:r>
             <a:r>
               <a:rPr lang="en-US" altLang="zh-CN" dirty="0" smtClean="0"/>
-              <a:t>How Database works”</a:t>
+              <a:t>What Database is”</a:t>
             </a:r>
             <a:endParaRPr lang="en-US" dirty="0"/>
+          </a:p>
+        </p:txBody>
+      </p:sp>
+      <p:sp>
+        <p:nvSpPr>
+          <p:cNvPr id="3" name="Content Placeholder 2"/>
+          <p:cNvSpPr>
+            <a:spLocks noGrp="1"/>
+          </p:cNvSpPr>
+          <p:nvPr>
+            <p:ph idx="1"/>
+          </p:nvPr>
+        </p:nvSpPr>
+        <p:spPr>
+          <a:xfrm>
+            <a:off x="381000" y="1646237"/>
+            <a:ext cx="8610600" cy="4525963"/>
+          </a:xfrm>
+        </p:spPr>
+        <p:txBody>
+          <a:bodyPr>
+            <a:normAutofit fontScale="92500"/>
+          </a:bodyPr>
+          <a:lstStyle/>
+          <a:p>
+            <a:r>
+              <a:rPr lang="en-US" altLang="zh-CN" dirty="0" smtClean="0"/>
+              <a:t>Databases consist of software-based "containers" that are structured to collect and store information.</a:t>
+            </a:r>
+          </a:p>
+          <a:p>
+            <a:r>
+              <a:rPr lang="en-US" altLang="zh-CN" dirty="0" smtClean="0"/>
+              <a:t>Database programs are designed for users so that they can retrieve, add, update or remove information.</a:t>
+            </a:r>
+          </a:p>
+          <a:p>
+            <a:r>
+              <a:rPr lang="en-US" altLang="zh-CN" dirty="0" smtClean="0"/>
+              <a:t>The structure of a database is tabular, consisting of rows and columns of information.</a:t>
+            </a:r>
+          </a:p>
+          <a:p>
+            <a:r>
+              <a:rPr lang="en-US" altLang="zh-CN" dirty="0" smtClean="0"/>
+              <a:t>A number of database architectures exist. Many databases use a combination of strategies.</a:t>
+            </a:r>
           </a:p>
         </p:txBody>
       </p:sp>
@@ -32183,6 +32445,290 @@
               <a:rPr lang="en-US" smtClean="0"/>
               <a:pPr/>
               <a:t>46</a:t>
+            </a:fld>
+            <a:endParaRPr lang="en-US" dirty="0"/>
+          </a:p>
+        </p:txBody>
+      </p:sp>
+      <p:pic>
+        <p:nvPicPr>
+          <p:cNvPr id="4" name="Picture 3" descr="logo.jpg"/>
+          <p:cNvPicPr>
+            <a:picLocks noChangeAspect="1"/>
+          </p:cNvPicPr>
+          <p:nvPr/>
+        </p:nvPicPr>
+        <p:blipFill>
+          <a:blip r:embed="rId2" cstate="print"/>
+          <a:stretch>
+            <a:fillRect/>
+          </a:stretch>
+        </p:blipFill>
+        <p:spPr>
+          <a:xfrm>
+            <a:off x="7956253" y="0"/>
+            <a:ext cx="1187747" cy="1328738"/>
+          </a:xfrm>
+          <a:prstGeom prst="rect">
+            <a:avLst/>
+          </a:prstGeom>
+        </p:spPr>
+      </p:pic>
+    </p:spTree>
+  </p:cSld>
+  <p:clrMapOvr>
+    <a:masterClrMapping/>
+  </p:clrMapOvr>
+  <p:timing>
+    <p:tnLst>
+      <p:par>
+        <p:cTn id="1" dur="indefinite" restart="never" nodeType="tmRoot"/>
+      </p:par>
+    </p:tnLst>
+  </p:timing>
+</p:sld>
+</file>
+
+<file path=ppt/slides/slide47.xml><?xml version="1.0" encoding="utf-8"?>
+<p:sld xmlns:a="http://schemas.openxmlformats.org/drawingml/2006/main" xmlns:r="http://schemas.openxmlformats.org/officeDocument/2006/relationships" xmlns:p="http://schemas.openxmlformats.org/presentationml/2006/main">
+  <p:cSld>
+    <p:spTree>
+      <p:nvGrpSpPr>
+        <p:cNvPr id="1" name=""/>
+        <p:cNvGrpSpPr/>
+        <p:nvPr/>
+      </p:nvGrpSpPr>
+      <p:grpSpPr>
+        <a:xfrm>
+          <a:off x="0" y="0"/>
+          <a:ext cx="0" cy="0"/>
+          <a:chOff x="0" y="0"/>
+          <a:chExt cx="0" cy="0"/>
+        </a:xfrm>
+      </p:grpSpPr>
+      <p:sp>
+        <p:nvSpPr>
+          <p:cNvPr id="2" name="Title 1"/>
+          <p:cNvSpPr>
+            <a:spLocks noGrp="1"/>
+          </p:cNvSpPr>
+          <p:nvPr>
+            <p:ph type="title"/>
+          </p:nvPr>
+        </p:nvSpPr>
+        <p:spPr>
+          <a:xfrm>
+            <a:off x="-76200" y="274638"/>
+            <a:ext cx="8382000" cy="1143000"/>
+          </a:xfrm>
+        </p:spPr>
+        <p:txBody>
+          <a:bodyPr>
+            <a:normAutofit fontScale="90000"/>
+          </a:bodyPr>
+          <a:lstStyle/>
+          <a:p>
+            <a:r>
+              <a:rPr lang="en-US" dirty="0" smtClean="0"/>
+              <a:t>Database</a:t>
+            </a:r>
+            <a:br>
+              <a:rPr lang="en-US" dirty="0" smtClean="0"/>
+            </a:br>
+            <a:r>
+              <a:rPr lang="en-US" dirty="0" smtClean="0"/>
+              <a:t>“</a:t>
+            </a:r>
+            <a:r>
+              <a:rPr lang="en-US" altLang="zh-CN" dirty="0" smtClean="0"/>
+              <a:t>What Database does in the project”</a:t>
+            </a:r>
+            <a:endParaRPr lang="en-US" dirty="0"/>
+          </a:p>
+        </p:txBody>
+      </p:sp>
+      <p:sp>
+        <p:nvSpPr>
+          <p:cNvPr id="3" name="Content Placeholder 2"/>
+          <p:cNvSpPr>
+            <a:spLocks noGrp="1"/>
+          </p:cNvSpPr>
+          <p:nvPr>
+            <p:ph idx="1"/>
+          </p:nvPr>
+        </p:nvSpPr>
+        <p:spPr>
+          <a:xfrm>
+            <a:off x="457200" y="1798637"/>
+            <a:ext cx="8229600" cy="4525963"/>
+          </a:xfrm>
+        </p:spPr>
+        <p:txBody>
+          <a:bodyPr>
+            <a:normAutofit/>
+          </a:bodyPr>
+          <a:lstStyle/>
+          <a:p>
+            <a:r>
+              <a:rPr lang="en-US" altLang="zh-CN" dirty="0" smtClean="0"/>
+              <a:t>The game database contains all of data records</a:t>
+            </a:r>
+          </a:p>
+          <a:p>
+            <a:r>
+              <a:rPr lang="en-US" altLang="zh-CN" dirty="0" smtClean="0"/>
+              <a:t>Tables collection of the names, parameters, status of all game units, and the game contents such as maps.</a:t>
+            </a:r>
+          </a:p>
+          <a:p>
+            <a:r>
+              <a:rPr lang="en-US" altLang="zh-CN" dirty="0" smtClean="0"/>
+              <a:t>The data is retrieved and overwritten for synchronous/ asynchronous backup.</a:t>
+            </a:r>
+            <a:endParaRPr lang="zh-CN" altLang="zh-CN" dirty="0" smtClean="0"/>
+          </a:p>
+        </p:txBody>
+      </p:sp>
+      <p:sp>
+        <p:nvSpPr>
+          <p:cNvPr id="5" name="Slide Number Placeholder 4"/>
+          <p:cNvSpPr>
+            <a:spLocks noGrp="1"/>
+          </p:cNvSpPr>
+          <p:nvPr>
+            <p:ph type="sldNum" sz="quarter" idx="12"/>
+          </p:nvPr>
+        </p:nvSpPr>
+        <p:spPr/>
+        <p:txBody>
+          <a:bodyPr/>
+          <a:lstStyle/>
+          <a:p>
+            <a:fld id="{B6F15528-21DE-4FAA-801E-634DDDAF4B2B}" type="slidenum">
+              <a:rPr lang="en-US" smtClean="0"/>
+              <a:pPr/>
+              <a:t>47</a:t>
+            </a:fld>
+            <a:endParaRPr lang="en-US" dirty="0"/>
+          </a:p>
+        </p:txBody>
+      </p:sp>
+      <p:pic>
+        <p:nvPicPr>
+          <p:cNvPr id="4" name="Picture 3" descr="logo.jpg"/>
+          <p:cNvPicPr>
+            <a:picLocks noChangeAspect="1"/>
+          </p:cNvPicPr>
+          <p:nvPr/>
+        </p:nvPicPr>
+        <p:blipFill>
+          <a:blip r:embed="rId2" cstate="print"/>
+          <a:stretch>
+            <a:fillRect/>
+          </a:stretch>
+        </p:blipFill>
+        <p:spPr>
+          <a:xfrm>
+            <a:off x="7956253" y="0"/>
+            <a:ext cx="1187747" cy="1328738"/>
+          </a:xfrm>
+          <a:prstGeom prst="rect">
+            <a:avLst/>
+          </a:prstGeom>
+        </p:spPr>
+      </p:pic>
+    </p:spTree>
+  </p:cSld>
+  <p:clrMapOvr>
+    <a:masterClrMapping/>
+  </p:clrMapOvr>
+  <p:timing>
+    <p:tnLst>
+      <p:par>
+        <p:cTn id="1" dur="indefinite" restart="never" nodeType="tmRoot"/>
+      </p:par>
+    </p:tnLst>
+  </p:timing>
+</p:sld>
+</file>
+
+<file path=ppt/slides/slide48.xml><?xml version="1.0" encoding="utf-8"?>
+<p:sld xmlns:a="http://schemas.openxmlformats.org/drawingml/2006/main" xmlns:r="http://schemas.openxmlformats.org/officeDocument/2006/relationships" xmlns:p="http://schemas.openxmlformats.org/presentationml/2006/main">
+  <p:cSld>
+    <p:spTree>
+      <p:nvGrpSpPr>
+        <p:cNvPr id="1" name=""/>
+        <p:cNvGrpSpPr/>
+        <p:nvPr/>
+      </p:nvGrpSpPr>
+      <p:grpSpPr>
+        <a:xfrm>
+          <a:off x="0" y="0"/>
+          <a:ext cx="0" cy="0"/>
+          <a:chOff x="0" y="0"/>
+          <a:chExt cx="0" cy="0"/>
+        </a:xfrm>
+      </p:grpSpPr>
+      <p:sp>
+        <p:nvSpPr>
+          <p:cNvPr id="2" name="Title 1"/>
+          <p:cNvSpPr>
+            <a:spLocks noGrp="1"/>
+          </p:cNvSpPr>
+          <p:nvPr>
+            <p:ph type="title"/>
+          </p:nvPr>
+        </p:nvSpPr>
+        <p:spPr>
+          <a:xfrm>
+            <a:off x="228600" y="274638"/>
+            <a:ext cx="8382000" cy="1143000"/>
+          </a:xfrm>
+        </p:spPr>
+        <p:txBody>
+          <a:bodyPr>
+            <a:normAutofit fontScale="90000"/>
+          </a:bodyPr>
+          <a:lstStyle/>
+          <a:p>
+            <a:r>
+              <a:rPr lang="en-US" dirty="0" smtClean="0"/>
+              <a:t>Database</a:t>
+            </a:r>
+            <a:br>
+              <a:rPr lang="en-US" dirty="0" smtClean="0"/>
+            </a:br>
+            <a:r>
+              <a:rPr lang="en-US" dirty="0" smtClean="0"/>
+              <a:t>“</a:t>
+            </a:r>
+            <a:r>
+              <a:rPr lang="en-US" altLang="zh-CN" dirty="0" smtClean="0"/>
+              <a:t>How Database works”</a:t>
+            </a:r>
+            <a:endParaRPr lang="en-US" dirty="0"/>
+          </a:p>
+        </p:txBody>
+      </p:sp>
+      <p:sp>
+        <p:nvSpPr>
+          <p:cNvPr id="5" name="Slide Number Placeholder 4"/>
+          <p:cNvSpPr>
+            <a:spLocks noGrp="1"/>
+          </p:cNvSpPr>
+          <p:nvPr>
+            <p:ph type="sldNum" sz="quarter" idx="12"/>
+          </p:nvPr>
+        </p:nvSpPr>
+        <p:spPr/>
+        <p:txBody>
+          <a:bodyPr/>
+          <a:lstStyle/>
+          <a:p>
+            <a:fld id="{B6F15528-21DE-4FAA-801E-634DDDAF4B2B}" type="slidenum">
+              <a:rPr lang="en-US" smtClean="0"/>
+              <a:pPr/>
+              <a:t>48</a:t>
             </a:fld>
             <a:endParaRPr lang="en-US" dirty="0"/>
           </a:p>
@@ -32259,7 +32805,7 @@
 </p:sld>
 </file>
 
-<file path=ppt/slides/slide47.xml><?xml version="1.0" encoding="utf-8"?>
+<file path=ppt/slides/slide49.xml><?xml version="1.0" encoding="utf-8"?>
 <p:sld xmlns:a="http://schemas.openxmlformats.org/drawingml/2006/main" xmlns:r="http://schemas.openxmlformats.org/officeDocument/2006/relationships" xmlns:p="http://schemas.openxmlformats.org/presentationml/2006/main">
   <p:cSld>
     <p:spTree>
@@ -32380,7 +32926,7 @@
             <a:fld id="{B6F15528-21DE-4FAA-801E-634DDDAF4B2B}" type="slidenum">
               <a:rPr lang="en-US" smtClean="0"/>
               <a:pPr/>
-              <a:t>47</a:t>
+              <a:t>49</a:t>
             </a:fld>
             <a:endParaRPr lang="en-US" dirty="0"/>
           </a:p>
@@ -32972,284 +33518,6 @@
 </p:sld>
 </file>
 
-<file path=ppt/slides/slide48.xml><?xml version="1.0" encoding="utf-8"?>
-<p:sld xmlns:a="http://schemas.openxmlformats.org/drawingml/2006/main" xmlns:r="http://schemas.openxmlformats.org/officeDocument/2006/relationships" xmlns:p="http://schemas.openxmlformats.org/presentationml/2006/main">
-  <p:cSld>
-    <p:spTree>
-      <p:nvGrpSpPr>
-        <p:cNvPr id="1" name=""/>
-        <p:cNvGrpSpPr/>
-        <p:nvPr/>
-      </p:nvGrpSpPr>
-      <p:grpSpPr>
-        <a:xfrm>
-          <a:off x="0" y="0"/>
-          <a:ext cx="0" cy="0"/>
-          <a:chOff x="0" y="0"/>
-          <a:chExt cx="0" cy="0"/>
-        </a:xfrm>
-      </p:grpSpPr>
-      <p:sp>
-        <p:nvSpPr>
-          <p:cNvPr id="2" name="Title 1"/>
-          <p:cNvSpPr>
-            <a:spLocks noGrp="1"/>
-          </p:cNvSpPr>
-          <p:nvPr>
-            <p:ph type="title"/>
-          </p:nvPr>
-        </p:nvSpPr>
-        <p:spPr>
-          <a:xfrm>
-            <a:off x="457200" y="381000"/>
-            <a:ext cx="7391400" cy="1143000"/>
-          </a:xfrm>
-        </p:spPr>
-        <p:txBody>
-          <a:bodyPr>
-            <a:normAutofit fontScale="90000"/>
-          </a:bodyPr>
-          <a:lstStyle/>
-          <a:p>
-            <a:r>
-              <a:rPr lang="en-US" dirty="0" smtClean="0"/>
-              <a:t>Database</a:t>
-            </a:r>
-            <a:br>
-              <a:rPr lang="en-US" dirty="0" smtClean="0"/>
-            </a:br>
-            <a:r>
-              <a:rPr lang="en-US" dirty="0" smtClean="0"/>
-              <a:t>“Conclusion”</a:t>
-            </a:r>
-            <a:endParaRPr lang="en-US" dirty="0"/>
-          </a:p>
-        </p:txBody>
-      </p:sp>
-      <p:sp>
-        <p:nvSpPr>
-          <p:cNvPr id="3" name="Content Placeholder 2"/>
-          <p:cNvSpPr>
-            <a:spLocks noGrp="1"/>
-          </p:cNvSpPr>
-          <p:nvPr>
-            <p:ph idx="1"/>
-          </p:nvPr>
-        </p:nvSpPr>
-        <p:spPr>
-          <a:xfrm>
-            <a:off x="609600" y="2362200"/>
-            <a:ext cx="8229600" cy="3657600"/>
-          </a:xfrm>
-        </p:spPr>
-        <p:txBody>
-          <a:bodyPr/>
-          <a:lstStyle/>
-          <a:p>
-            <a:r>
-              <a:rPr lang="en-US" altLang="zh-CN" dirty="0" smtClean="0"/>
-              <a:t>Database functions like a background support to other modules.</a:t>
-            </a:r>
-          </a:p>
-          <a:p>
-            <a:r>
-              <a:rPr lang="en-US" altLang="zh-CN" dirty="0" smtClean="0"/>
-              <a:t>Database provides good organization of the game data.</a:t>
-            </a:r>
-          </a:p>
-          <a:p>
-            <a:r>
-              <a:rPr lang="en-US" altLang="zh-CN" dirty="0" smtClean="0"/>
-              <a:t>Database is useful for Storage and Retrieval of map and unit Data.</a:t>
-            </a:r>
-          </a:p>
-        </p:txBody>
-      </p:sp>
-      <p:sp>
-        <p:nvSpPr>
-          <p:cNvPr id="5" name="Slide Number Placeholder 4"/>
-          <p:cNvSpPr>
-            <a:spLocks noGrp="1"/>
-          </p:cNvSpPr>
-          <p:nvPr>
-            <p:ph type="sldNum" sz="quarter" idx="12"/>
-          </p:nvPr>
-        </p:nvSpPr>
-        <p:spPr/>
-        <p:txBody>
-          <a:bodyPr/>
-          <a:lstStyle/>
-          <a:p>
-            <a:fld id="{B6F15528-21DE-4FAA-801E-634DDDAF4B2B}" type="slidenum">
-              <a:rPr lang="en-US" smtClean="0"/>
-              <a:pPr/>
-              <a:t>48</a:t>
-            </a:fld>
-            <a:endParaRPr lang="en-US" dirty="0"/>
-          </a:p>
-        </p:txBody>
-      </p:sp>
-      <p:pic>
-        <p:nvPicPr>
-          <p:cNvPr id="4" name="Picture 3" descr="logo.jpg"/>
-          <p:cNvPicPr>
-            <a:picLocks noChangeAspect="1"/>
-          </p:cNvPicPr>
-          <p:nvPr/>
-        </p:nvPicPr>
-        <p:blipFill>
-          <a:blip r:embed="rId2" cstate="print"/>
-          <a:stretch>
-            <a:fillRect/>
-          </a:stretch>
-        </p:blipFill>
-        <p:spPr>
-          <a:xfrm>
-            <a:off x="7956253" y="0"/>
-            <a:ext cx="1187747" cy="1328738"/>
-          </a:xfrm>
-          <a:prstGeom prst="rect">
-            <a:avLst/>
-          </a:prstGeom>
-        </p:spPr>
-      </p:pic>
-    </p:spTree>
-  </p:cSld>
-  <p:clrMapOvr>
-    <a:masterClrMapping/>
-  </p:clrMapOvr>
-  <p:timing>
-    <p:tnLst>
-      <p:par>
-        <p:cTn id="1" dur="indefinite" restart="never" nodeType="tmRoot"/>
-      </p:par>
-    </p:tnLst>
-  </p:timing>
-</p:sld>
-</file>
-
-<file path=ppt/slides/slide49.xml><?xml version="1.0" encoding="utf-8"?>
-<p:sld xmlns:a="http://schemas.openxmlformats.org/drawingml/2006/main" xmlns:r="http://schemas.openxmlformats.org/officeDocument/2006/relationships" xmlns:p="http://schemas.openxmlformats.org/presentationml/2006/main">
-  <p:cSld>
-    <p:spTree>
-      <p:nvGrpSpPr>
-        <p:cNvPr id="1" name=""/>
-        <p:cNvGrpSpPr/>
-        <p:nvPr/>
-      </p:nvGrpSpPr>
-      <p:grpSpPr>
-        <a:xfrm>
-          <a:off x="0" y="0"/>
-          <a:ext cx="0" cy="0"/>
-          <a:chOff x="0" y="0"/>
-          <a:chExt cx="0" cy="0"/>
-        </a:xfrm>
-      </p:grpSpPr>
-      <p:sp>
-        <p:nvSpPr>
-          <p:cNvPr id="2" name="Title 1"/>
-          <p:cNvSpPr>
-            <a:spLocks noGrp="1"/>
-          </p:cNvSpPr>
-          <p:nvPr>
-            <p:ph type="title"/>
-          </p:nvPr>
-        </p:nvSpPr>
-        <p:spPr/>
-        <p:txBody>
-          <a:bodyPr/>
-          <a:lstStyle/>
-          <a:p>
-            <a:r>
-              <a:rPr lang="en-US" dirty="0" smtClean="0"/>
-              <a:t>Summary </a:t>
-            </a:r>
-            <a:endParaRPr lang="en-US" dirty="0"/>
-          </a:p>
-        </p:txBody>
-      </p:sp>
-      <p:sp>
-        <p:nvSpPr>
-          <p:cNvPr id="3" name="Content Placeholder 2"/>
-          <p:cNvSpPr>
-            <a:spLocks noGrp="1"/>
-          </p:cNvSpPr>
-          <p:nvPr>
-            <p:ph idx="1"/>
-          </p:nvPr>
-        </p:nvSpPr>
-        <p:spPr/>
-        <p:txBody>
-          <a:bodyPr/>
-          <a:lstStyle/>
-          <a:p>
-            <a:endParaRPr lang="en-US" dirty="0"/>
-          </a:p>
-        </p:txBody>
-      </p:sp>
-      <p:sp>
-        <p:nvSpPr>
-          <p:cNvPr id="5" name="Slide Number Placeholder 4"/>
-          <p:cNvSpPr>
-            <a:spLocks noGrp="1"/>
-          </p:cNvSpPr>
-          <p:nvPr>
-            <p:ph type="sldNum" sz="quarter" idx="12"/>
-          </p:nvPr>
-        </p:nvSpPr>
-        <p:spPr/>
-        <p:txBody>
-          <a:bodyPr/>
-          <a:lstStyle/>
-          <a:p>
-            <a:fld id="{B6F15528-21DE-4FAA-801E-634DDDAF4B2B}" type="slidenum">
-              <a:rPr lang="en-US" smtClean="0"/>
-              <a:pPr/>
-              <a:t>49</a:t>
-            </a:fld>
-            <a:endParaRPr lang="en-US" dirty="0"/>
-          </a:p>
-        </p:txBody>
-      </p:sp>
-      <p:pic>
-        <p:nvPicPr>
-          <p:cNvPr id="4" name="Picture 3" descr="logo.jpg"/>
-          <p:cNvPicPr>
-            <a:picLocks noChangeAspect="1"/>
-          </p:cNvPicPr>
-          <p:nvPr/>
-        </p:nvPicPr>
-        <p:blipFill>
-          <a:blip r:embed="rId2" cstate="print"/>
-          <a:stretch>
-            <a:fillRect/>
-          </a:stretch>
-        </p:blipFill>
-        <p:spPr>
-          <a:xfrm>
-            <a:off x="7956253" y="0"/>
-            <a:ext cx="1187747" cy="1328738"/>
-          </a:xfrm>
-          <a:prstGeom prst="rect">
-            <a:avLst/>
-          </a:prstGeom>
-        </p:spPr>
-      </p:pic>
-    </p:spTree>
-  </p:cSld>
-  <p:clrMapOvr>
-    <a:masterClrMapping/>
-  </p:clrMapOvr>
-  <p:timing>
-    <p:tnLst>
-      <p:par>
-        <p:cTn id="1" dur="indefinite" restart="never" nodeType="tmRoot"/>
-      </p:par>
-    </p:tnLst>
-  </p:timing>
-</p:sld>
-</file>
-
 <file path=ppt/slides/slide5.xml><?xml version="1.0" encoding="utf-8"?>
 <p:sld xmlns:a="http://schemas.openxmlformats.org/drawingml/2006/main" xmlns:r="http://schemas.openxmlformats.org/officeDocument/2006/relationships" xmlns:p="http://schemas.openxmlformats.org/presentationml/2006/main">
   <p:cSld>
@@ -33484,14 +33752,170 @@
             <p:ph type="title"/>
           </p:nvPr>
         </p:nvSpPr>
+        <p:spPr>
+          <a:xfrm>
+            <a:off x="457200" y="381000"/>
+            <a:ext cx="7391400" cy="1143000"/>
+          </a:xfrm>
+        </p:spPr>
+        <p:txBody>
+          <a:bodyPr>
+            <a:normAutofit fontScale="90000"/>
+          </a:bodyPr>
+          <a:lstStyle/>
+          <a:p>
+            <a:r>
+              <a:rPr lang="en-US" dirty="0" smtClean="0"/>
+              <a:t>Database</a:t>
+            </a:r>
+            <a:br>
+              <a:rPr lang="en-US" dirty="0" smtClean="0"/>
+            </a:br>
+            <a:r>
+              <a:rPr lang="en-US" dirty="0" smtClean="0"/>
+              <a:t>“Conclusion”</a:t>
+            </a:r>
+            <a:endParaRPr lang="en-US" dirty="0"/>
+          </a:p>
+        </p:txBody>
+      </p:sp>
+      <p:sp>
+        <p:nvSpPr>
+          <p:cNvPr id="3" name="Content Placeholder 2"/>
+          <p:cNvSpPr>
+            <a:spLocks noGrp="1"/>
+          </p:cNvSpPr>
+          <p:nvPr>
+            <p:ph idx="1"/>
+          </p:nvPr>
+        </p:nvSpPr>
+        <p:spPr>
+          <a:xfrm>
+            <a:off x="609600" y="2362200"/>
+            <a:ext cx="8229600" cy="3657600"/>
+          </a:xfrm>
+        </p:spPr>
+        <p:txBody>
+          <a:bodyPr/>
+          <a:lstStyle/>
+          <a:p>
+            <a:r>
+              <a:rPr lang="en-US" altLang="zh-CN" dirty="0" smtClean="0"/>
+              <a:t>Database functions like a background support to other modules.</a:t>
+            </a:r>
+          </a:p>
+          <a:p>
+            <a:r>
+              <a:rPr lang="en-US" altLang="zh-CN" dirty="0" smtClean="0"/>
+              <a:t>Database provides good organization of the game data.</a:t>
+            </a:r>
+          </a:p>
+          <a:p>
+            <a:r>
+              <a:rPr lang="en-US" altLang="zh-CN" dirty="0" smtClean="0"/>
+              <a:t>Database is useful for Storage and Retrieval of map and unit Data.</a:t>
+            </a:r>
+          </a:p>
+        </p:txBody>
+      </p:sp>
+      <p:sp>
+        <p:nvSpPr>
+          <p:cNvPr id="5" name="Slide Number Placeholder 4"/>
+          <p:cNvSpPr>
+            <a:spLocks noGrp="1"/>
+          </p:cNvSpPr>
+          <p:nvPr>
+            <p:ph type="sldNum" sz="quarter" idx="12"/>
+          </p:nvPr>
+        </p:nvSpPr>
         <p:spPr/>
         <p:txBody>
           <a:bodyPr/>
           <a:lstStyle/>
           <a:p>
+            <a:fld id="{B6F15528-21DE-4FAA-801E-634DDDAF4B2B}" type="slidenum">
+              <a:rPr lang="en-US" smtClean="0"/>
+              <a:pPr/>
+              <a:t>50</a:t>
+            </a:fld>
+            <a:endParaRPr lang="en-US" dirty="0"/>
+          </a:p>
+        </p:txBody>
+      </p:sp>
+      <p:pic>
+        <p:nvPicPr>
+          <p:cNvPr id="4" name="Picture 3" descr="logo.jpg"/>
+          <p:cNvPicPr>
+            <a:picLocks noChangeAspect="1"/>
+          </p:cNvPicPr>
+          <p:nvPr/>
+        </p:nvPicPr>
+        <p:blipFill>
+          <a:blip r:embed="rId2" cstate="print"/>
+          <a:stretch>
+            <a:fillRect/>
+          </a:stretch>
+        </p:blipFill>
+        <p:spPr>
+          <a:xfrm>
+            <a:off x="7956253" y="0"/>
+            <a:ext cx="1187747" cy="1328738"/>
+          </a:xfrm>
+          <a:prstGeom prst="rect">
+            <a:avLst/>
+          </a:prstGeom>
+        </p:spPr>
+      </p:pic>
+    </p:spTree>
+  </p:cSld>
+  <p:clrMapOvr>
+    <a:masterClrMapping/>
+  </p:clrMapOvr>
+  <p:timing>
+    <p:tnLst>
+      <p:par>
+        <p:cTn id="1" dur="indefinite" restart="never" nodeType="tmRoot"/>
+      </p:par>
+    </p:tnLst>
+  </p:timing>
+</p:sld>
+</file>
+
+<file path=ppt/slides/slide51.xml><?xml version="1.0" encoding="utf-8"?>
+<p:sld xmlns:a="http://schemas.openxmlformats.org/drawingml/2006/main" xmlns:r="http://schemas.openxmlformats.org/officeDocument/2006/relationships" xmlns:p="http://schemas.openxmlformats.org/presentationml/2006/main">
+  <p:cSld>
+    <p:spTree>
+      <p:nvGrpSpPr>
+        <p:cNvPr id="1" name=""/>
+        <p:cNvGrpSpPr/>
+        <p:nvPr/>
+      </p:nvGrpSpPr>
+      <p:grpSpPr>
+        <a:xfrm>
+          <a:off x="0" y="0"/>
+          <a:ext cx="0" cy="0"/>
+          <a:chOff x="0" y="0"/>
+          <a:chExt cx="0" cy="0"/>
+        </a:xfrm>
+      </p:grpSpPr>
+      <p:sp>
+        <p:nvSpPr>
+          <p:cNvPr id="2" name="Title 1"/>
+          <p:cNvSpPr>
+            <a:spLocks noGrp="1"/>
+          </p:cNvSpPr>
+          <p:nvPr>
+            <p:ph type="title"/>
+          </p:nvPr>
+        </p:nvSpPr>
+        <p:spPr/>
+        <p:txBody>
+          <a:bodyPr/>
+          <a:lstStyle/>
+          <a:p>
             <a:r>
               <a:rPr lang="en-US" dirty="0" smtClean="0"/>
-              <a:t>Conclusion</a:t>
+              <a:t>Duel Reality: Conclusion</a:t>
             </a:r>
             <a:endParaRPr lang="en-US" dirty="0"/>
           </a:p>
@@ -33514,19 +33938,33 @@
           <a:p>
             <a:r>
               <a:rPr lang="en-US" dirty="0" smtClean="0"/>
-              <a:t>Conclude this presentation</a:t>
-            </a:r>
-          </a:p>
-          <a:p>
+              <a:t>Told you about our awesome game </a:t>
+            </a:r>
+          </a:p>
+          <a:p>
+            <a:pPr lvl="1"/>
             <a:r>
               <a:rPr lang="en-US" dirty="0" smtClean="0"/>
-              <a:t>Told you about our awesome game </a:t>
+              <a:t>Details</a:t>
+            </a:r>
+          </a:p>
+          <a:p>
+            <a:pPr lvl="1"/>
+            <a:r>
+              <a:rPr lang="en-US" dirty="0" smtClean="0"/>
+              <a:t>Modules – Graphics, UI, Game Mechanics &amp;AI, Database</a:t>
             </a:r>
           </a:p>
           <a:p>
             <a:r>
               <a:rPr lang="en-US" dirty="0" smtClean="0"/>
               <a:t>Pre-orders available</a:t>
+            </a:r>
+          </a:p>
+          <a:p>
+            <a:r>
+              <a:rPr lang="en-US" dirty="0" smtClean="0"/>
+              <a:t>Thanks for your attention</a:t>
             </a:r>
           </a:p>
         </p:txBody>
@@ -33549,7 +33987,7 @@
             <a:fld id="{B6F15528-21DE-4FAA-801E-634DDDAF4B2B}" type="slidenum">
               <a:rPr lang="en-US" smtClean="0"/>
               <a:pPr/>
-              <a:t>50</a:t>
+              <a:t>51</a:t>
             </a:fld>
             <a:endParaRPr lang="en-US" dirty="0"/>
           </a:p>
@@ -33587,7 +34025,7 @@
 </p:sld>
 </file>
 
-<file path=ppt/slides/slide51.xml><?xml version="1.0" encoding="utf-8"?>
+<file path=ppt/slides/slide52.xml><?xml version="1.0" encoding="utf-8"?>
 <p:sld xmlns:a="http://schemas.openxmlformats.org/drawingml/2006/main" xmlns:r="http://schemas.openxmlformats.org/officeDocument/2006/relationships" xmlns:p="http://schemas.openxmlformats.org/presentationml/2006/main">
   <p:cSld>
     <p:spTree>
@@ -33645,7 +34083,7 @@
             <a:fld id="{B6F15528-21DE-4FAA-801E-634DDDAF4B2B}" type="slidenum">
               <a:rPr lang="en-US" smtClean="0"/>
               <a:pPr/>
-              <a:t>51</a:t>
+              <a:t>52</a:t>
             </a:fld>
             <a:endParaRPr lang="en-US" dirty="0"/>
           </a:p>
@@ -33673,6 +34111,32 @@
           <a:prstGeom prst="rect">
             <a:avLst/>
           </a:prstGeom>
+        </p:spPr>
+      </p:pic>
+      <p:pic>
+        <p:nvPicPr>
+          <p:cNvPr id="1027" name="Picture 3" descr="C:\Users\KilgoreJ\AppData\Local\Microsoft\Windows\Temporary Internet Files\Content.IE5\40LK1M2T\MM900234752[1].gif"/>
+          <p:cNvPicPr>
+            <a:picLocks noChangeAspect="1" noChangeArrowheads="1" noCrop="1"/>
+          </p:cNvPicPr>
+          <p:nvPr/>
+        </p:nvPicPr>
+        <p:blipFill>
+          <a:blip r:embed="rId3" cstate="print"/>
+          <a:srcRect/>
+          <a:stretch>
+            <a:fillRect/>
+          </a:stretch>
+        </p:blipFill>
+        <p:spPr bwMode="auto">
+          <a:xfrm>
+            <a:off x="3352800" y="2743200"/>
+            <a:ext cx="2249905" cy="2514600"/>
+          </a:xfrm>
+          <a:prstGeom prst="rect">
+            <a:avLst/>
+          </a:prstGeom>
+          <a:noFill/>
         </p:spPr>
       </p:pic>
     </p:spTree>

</xml_diff>